<commit_message>
Changes in Invoice Matching Applicaiton PPT
</commit_message>
<xml_diff>
--- a/Invoice Matching Application .pptx
+++ b/Invoice Matching Application .pptx
@@ -5,7 +5,7 @@
     <p:sldMasterId id="2147483648" r:id="rId1"/>
   </p:sldMasterIdLst>
   <p:notesMasterIdLst>
-    <p:notesMasterId r:id="rId21"/>
+    <p:notesMasterId r:id="rId22"/>
   </p:notesMasterIdLst>
   <p:sldIdLst>
     <p:sldId id="256" r:id="rId2"/>
@@ -15,18 +15,19 @@
     <p:sldId id="262" r:id="rId6"/>
     <p:sldId id="266" r:id="rId7"/>
     <p:sldId id="269" r:id="rId8"/>
-    <p:sldId id="270" r:id="rId9"/>
-    <p:sldId id="267" r:id="rId10"/>
-    <p:sldId id="272" r:id="rId11"/>
-    <p:sldId id="273" r:id="rId12"/>
+    <p:sldId id="267" r:id="rId9"/>
+    <p:sldId id="272" r:id="rId10"/>
+    <p:sldId id="273" r:id="rId11"/>
+    <p:sldId id="284" r:id="rId12"/>
     <p:sldId id="268" r:id="rId13"/>
     <p:sldId id="274" r:id="rId14"/>
     <p:sldId id="279" r:id="rId15"/>
     <p:sldId id="280" r:id="rId16"/>
     <p:sldId id="281" r:id="rId17"/>
-    <p:sldId id="282" r:id="rId18"/>
-    <p:sldId id="264" r:id="rId19"/>
-    <p:sldId id="265" r:id="rId20"/>
+    <p:sldId id="283" r:id="rId18"/>
+    <p:sldId id="285" r:id="rId19"/>
+    <p:sldId id="264" r:id="rId20"/>
+    <p:sldId id="265" r:id="rId21"/>
   </p:sldIdLst>
   <p:sldSz cx="12192000" cy="6858000"/>
   <p:notesSz cx="6858000" cy="9144000"/>
@@ -125,6 +126,11 @@
       </a:defRPr>
     </a:lvl9pPr>
   </p:defaultTextStyle>
+  <p:extLst>
+    <p:ext uri="{EFAFB233-063F-42B5-8137-9DF3F51BA10A}">
+      <p15:sldGuideLst xmlns:p15="http://schemas.microsoft.com/office/powerpoint/2012/main"/>
+    </p:ext>
+  </p:extLst>
 </p:presentation>
 </file>
 
@@ -837,6 +843,90 @@
     <p:extLst>
       <p:ext uri="{BB962C8B-B14F-4D97-AF65-F5344CB8AC3E}">
         <p14:creationId xmlns:p14="http://schemas.microsoft.com/office/powerpoint/2010/main" val="3722026134"/>
+      </p:ext>
+    </p:extLst>
+  </p:cSld>
+  <p:clrMapOvr>
+    <a:masterClrMapping/>
+  </p:clrMapOvr>
+</p:notes>
+</file>
+
+<file path=ppt/notesSlides/notesSlide3.xml><?xml version="1.0" encoding="utf-8"?>
+<p:notes xmlns:a="http://schemas.openxmlformats.org/drawingml/2006/main" xmlns:r="http://schemas.openxmlformats.org/officeDocument/2006/relationships" xmlns:p="http://schemas.openxmlformats.org/presentationml/2006/main">
+  <p:cSld>
+    <p:spTree>
+      <p:nvGrpSpPr>
+        <p:cNvPr id="1" name=""/>
+        <p:cNvGrpSpPr/>
+        <p:nvPr/>
+      </p:nvGrpSpPr>
+      <p:grpSpPr>
+        <a:xfrm>
+          <a:off x="0" y="0"/>
+          <a:ext cx="0" cy="0"/>
+          <a:chOff x="0" y="0"/>
+          <a:chExt cx="0" cy="0"/>
+        </a:xfrm>
+      </p:grpSpPr>
+      <p:sp>
+        <p:nvSpPr>
+          <p:cNvPr id="2" name="Slide Image Placeholder 1"/>
+          <p:cNvSpPr>
+            <a:spLocks noGrp="1" noRot="1" noChangeAspect="1"/>
+          </p:cNvSpPr>
+          <p:nvPr>
+            <p:ph type="sldImg"/>
+          </p:nvPr>
+        </p:nvSpPr>
+        <p:spPr/>
+      </p:sp>
+      <p:sp>
+        <p:nvSpPr>
+          <p:cNvPr id="3" name="Notes Placeholder 2"/>
+          <p:cNvSpPr>
+            <a:spLocks noGrp="1"/>
+          </p:cNvSpPr>
+          <p:nvPr>
+            <p:ph type="body" idx="1"/>
+          </p:nvPr>
+        </p:nvSpPr>
+        <p:spPr/>
+        <p:txBody>
+          <a:bodyPr/>
+          <a:lstStyle/>
+          <a:p>
+            <a:endParaRPr lang="en-US" dirty="0"/>
+          </a:p>
+        </p:txBody>
+      </p:sp>
+      <p:sp>
+        <p:nvSpPr>
+          <p:cNvPr id="4" name="Slide Number Placeholder 3"/>
+          <p:cNvSpPr>
+            <a:spLocks noGrp="1"/>
+          </p:cNvSpPr>
+          <p:nvPr>
+            <p:ph type="sldNum" sz="quarter" idx="5"/>
+          </p:nvPr>
+        </p:nvSpPr>
+        <p:spPr/>
+        <p:txBody>
+          <a:bodyPr/>
+          <a:lstStyle/>
+          <a:p>
+            <a:fld id="{74249045-C3C8-6542-886D-F265C9CEAFE9}" type="slidenum">
+              <a:rPr lang="en-US" smtClean="0"/>
+              <a:t>9</a:t>
+            </a:fld>
+            <a:endParaRPr lang="en-US"/>
+          </a:p>
+        </p:txBody>
+      </p:sp>
+    </p:spTree>
+    <p:extLst>
+      <p:ext uri="{BB962C8B-B14F-4D97-AF65-F5344CB8AC3E}">
+        <p14:creationId xmlns:p14="http://schemas.microsoft.com/office/powerpoint/2010/main" val="3303686200"/>
       </p:ext>
     </p:extLst>
   </p:cSld>
@@ -8416,7 +8506,7 @@
             <a:pPr algn="r"/>
             <a:r>
               <a:rPr lang="en-US" dirty="0"/>
-              <a:t>- Suresh CHINNA SHANMUGAM</a:t>
+              <a:t>- Developed by Suresh CHINNA SHANMUGAM</a:t>
             </a:r>
           </a:p>
         </p:txBody>
@@ -8469,24 +8559,85 @@
         </p:nvSpPr>
         <p:spPr>
           <a:xfrm>
-            <a:off x="1608667" y="387044"/>
-            <a:ext cx="10447866" cy="1280890"/>
+            <a:off x="1543988" y="474210"/>
+            <a:ext cx="9870683" cy="979838"/>
           </a:xfrm>
         </p:spPr>
         <p:txBody>
           <a:bodyPr/>
           <a:lstStyle/>
           <a:p>
-            <a:endParaRPr lang="en-US" dirty="0"/>
+            <a:r>
+              <a:rPr lang="en-US" dirty="0"/>
+              <a:t>Code &amp; Data Paths – Input/output</a:t>
+            </a:r>
           </a:p>
         </p:txBody>
       </p:sp>
-      <p:sp>
-        <p:nvSpPr>
-          <p:cNvPr id="3" name="Content Placeholder 2">
+      <p:pic>
+        <p:nvPicPr>
+          <p:cNvPr id="7" name="Content Placeholder 6">
             <a:extLst>
               <a:ext uri="{FF2B5EF4-FFF2-40B4-BE49-F238E27FC236}">
-                <a16:creationId xmlns:a16="http://schemas.microsoft.com/office/drawing/2014/main" id="{1A5F025B-D545-6448-A4FE-43C664451943}"/>
+                <a16:creationId xmlns:a16="http://schemas.microsoft.com/office/drawing/2014/main" id="{05DF5106-4EC6-8C46-9A26-C9A4B1A31E15}"/>
+              </a:ext>
+            </a:extLst>
+          </p:cNvPr>
+          <p:cNvPicPr>
+            <a:picLocks noGrp="1" noChangeAspect="1"/>
+          </p:cNvPicPr>
+          <p:nvPr>
+            <p:ph sz="half" idx="1"/>
+          </p:nvPr>
+        </p:nvPicPr>
+        <p:blipFill>
+          <a:blip r:embed="rId2"/>
+          <a:stretch>
+            <a:fillRect/>
+          </a:stretch>
+        </p:blipFill>
+        <p:spPr>
+          <a:xfrm>
+            <a:off x="5029194" y="1334301"/>
+            <a:ext cx="6475418" cy="452689"/>
+          </a:xfrm>
+        </p:spPr>
+      </p:pic>
+      <p:pic>
+        <p:nvPicPr>
+          <p:cNvPr id="9" name="Content Placeholder 8">
+            <a:extLst>
+              <a:ext uri="{FF2B5EF4-FFF2-40B4-BE49-F238E27FC236}">
+                <a16:creationId xmlns:a16="http://schemas.microsoft.com/office/drawing/2014/main" id="{FB65D282-DD05-A24C-B6D1-5CB65BA93092}"/>
+              </a:ext>
+            </a:extLst>
+          </p:cNvPr>
+          <p:cNvPicPr>
+            <a:picLocks noGrp="1" noChangeAspect="1"/>
+          </p:cNvPicPr>
+          <p:nvPr>
+            <p:ph sz="half" idx="2"/>
+          </p:nvPr>
+        </p:nvPicPr>
+        <p:blipFill>
+          <a:blip r:embed="rId3"/>
+          <a:stretch>
+            <a:fillRect/>
+          </a:stretch>
+        </p:blipFill>
+        <p:spPr>
+          <a:xfrm>
+            <a:off x="5029192" y="4924108"/>
+            <a:ext cx="6475417" cy="460209"/>
+          </a:xfrm>
+        </p:spPr>
+      </p:pic>
+      <p:sp>
+        <p:nvSpPr>
+          <p:cNvPr id="13" name="Subtitle 12">
+            <a:extLst>
+              <a:ext uri="{FF2B5EF4-FFF2-40B4-BE49-F238E27FC236}">
+                <a16:creationId xmlns:a16="http://schemas.microsoft.com/office/drawing/2014/main" id="{E7FF2314-3026-4F42-B882-94ADFB9363AC}"/>
               </a:ext>
             </a:extLst>
           </p:cNvPr>
@@ -8494,27 +8645,369 @@
             <a:spLocks noGrp="1"/>
           </p:cNvSpPr>
           <p:nvPr>
-            <p:ph idx="1"/>
+            <p:ph type="subTitle" idx="4294967295"/>
           </p:nvPr>
         </p:nvSpPr>
         <p:spPr>
           <a:xfrm>
-            <a:off x="1608667" y="1667934"/>
-            <a:ext cx="10447866" cy="5190066"/>
+            <a:off x="687389" y="1454048"/>
+            <a:ext cx="4962582" cy="5291525"/>
           </a:xfrm>
         </p:spPr>
         <p:txBody>
-          <a:bodyPr/>
+          <a:bodyPr>
+            <a:normAutofit fontScale="85000" lnSpcReduction="20000"/>
+          </a:bodyPr>
           <a:lstStyle/>
           <a:p>
+            <a:r>
+              <a:rPr lang="en-US" dirty="0"/>
+              <a:t>Project Path: </a:t>
+            </a:r>
+          </a:p>
+          <a:p>
+            <a:pPr lvl="1"/>
+            <a:r>
+              <a:rPr lang="en-US" dirty="0"/>
+              <a:t>~/</a:t>
+            </a:r>
+            <a:r>
+              <a:rPr lang="en-US" dirty="0" err="1"/>
+              <a:t>PycharmProjects</a:t>
+            </a:r>
+            <a:r>
+              <a:rPr lang="en-US" dirty="0"/>
+              <a:t>/</a:t>
+            </a:r>
+            <a:r>
+              <a:rPr lang="en-US" dirty="0" err="1"/>
+              <a:t>InvoiceProcessing</a:t>
+            </a:r>
             <a:endParaRPr lang="en-US" dirty="0"/>
           </a:p>
+          <a:p>
+            <a:pPr marL="457200" lvl="1" indent="0">
+              <a:buNone/>
+            </a:pPr>
+            <a:r>
+              <a:rPr lang="en-US" dirty="0"/>
+              <a:t>Files: </a:t>
+            </a:r>
+            <a:r>
+              <a:rPr lang="en-US" dirty="0" err="1"/>
+              <a:t>main.py</a:t>
+            </a:r>
+            <a:endParaRPr lang="en-US" dirty="0"/>
+          </a:p>
+          <a:p>
+            <a:pPr marL="457200" lvl="1" indent="0">
+              <a:buNone/>
+            </a:pPr>
+            <a:r>
+              <a:rPr lang="en-US" dirty="0"/>
+              <a:t>	</a:t>
+            </a:r>
+            <a:r>
+              <a:rPr lang="en-IN" dirty="0" err="1"/>
+              <a:t>InvoiceProcess.py</a:t>
+            </a:r>
+            <a:endParaRPr lang="en-IN" dirty="0"/>
+          </a:p>
+          <a:p>
+            <a:pPr marL="457200" lvl="1" indent="0">
+              <a:buNone/>
+            </a:pPr>
+            <a:r>
+              <a:rPr lang="en-IN" dirty="0"/>
+              <a:t>Templates:</a:t>
+            </a:r>
+          </a:p>
+          <a:p>
+            <a:pPr marL="457200" lvl="1" indent="0">
+              <a:buNone/>
+            </a:pPr>
+            <a:r>
+              <a:rPr lang="en-IN" dirty="0"/>
+              <a:t>	Html Files listed in previous page</a:t>
+            </a:r>
+          </a:p>
+          <a:p>
+            <a:pPr marL="457200" lvl="1" indent="0">
+              <a:buNone/>
+            </a:pPr>
+            <a:r>
+              <a:rPr lang="en-US" dirty="0"/>
+              <a:t>Log File: </a:t>
+            </a:r>
+          </a:p>
+          <a:p>
+            <a:pPr marL="457200" lvl="1" indent="0">
+              <a:buNone/>
+            </a:pPr>
+            <a:r>
+              <a:rPr lang="en-US" dirty="0"/>
+              <a:t>	</a:t>
+            </a:r>
+            <a:r>
+              <a:rPr lang="en-IN" dirty="0"/>
+              <a:t> </a:t>
+            </a:r>
+            <a:r>
+              <a:rPr lang="en-IN" dirty="0" err="1"/>
+              <a:t>InvoiceProcessing.log</a:t>
+            </a:r>
+            <a:endParaRPr lang="en-US" dirty="0"/>
+          </a:p>
+          <a:p>
+            <a:r>
+              <a:rPr lang="en-US" dirty="0"/>
+              <a:t>Input:</a:t>
+            </a:r>
+          </a:p>
+          <a:p>
+            <a:pPr lvl="1"/>
+            <a:r>
+              <a:rPr lang="en-US" dirty="0"/>
+              <a:t>~/</a:t>
+            </a:r>
+            <a:r>
+              <a:rPr lang="en-US" dirty="0" err="1"/>
+              <a:t>PycharmProjects</a:t>
+            </a:r>
+            <a:r>
+              <a:rPr lang="en-US" dirty="0"/>
+              <a:t>/input</a:t>
+            </a:r>
+          </a:p>
+          <a:p>
+            <a:pPr lvl="1"/>
+            <a:r>
+              <a:rPr lang="en-US" dirty="0"/>
+              <a:t>File: CSV File: </a:t>
+            </a:r>
+            <a:r>
+              <a:rPr lang="en-IN" dirty="0" err="1"/>
+              <a:t>InvoiceTestData.csv</a:t>
+            </a:r>
+            <a:endParaRPr lang="en-US" dirty="0"/>
+          </a:p>
+          <a:p>
+            <a:r>
+              <a:rPr lang="en-US" dirty="0"/>
+              <a:t>Output:</a:t>
+            </a:r>
+          </a:p>
+          <a:p>
+            <a:pPr lvl="1"/>
+            <a:r>
+              <a:rPr lang="en-US" dirty="0"/>
+              <a:t>Path: ~/</a:t>
+            </a:r>
+            <a:r>
+              <a:rPr lang="en-US" dirty="0" err="1"/>
+              <a:t>PycharmProjects</a:t>
+            </a:r>
+            <a:r>
+              <a:rPr lang="en-US" dirty="0"/>
+              <a:t>/output</a:t>
+            </a:r>
+          </a:p>
+          <a:p>
+            <a:pPr lvl="1"/>
+            <a:r>
+              <a:rPr lang="en-US" dirty="0"/>
+              <a:t>Temp Files: </a:t>
+            </a:r>
+            <a:r>
+              <a:rPr lang="en-IN" dirty="0"/>
+              <a:t>Json Files: </a:t>
+            </a:r>
+          </a:p>
+          <a:p>
+            <a:pPr lvl="2"/>
+            <a:r>
+              <a:rPr lang="en-IN" dirty="0" err="1"/>
+              <a:t>AllRecords.json</a:t>
+            </a:r>
+            <a:endParaRPr lang="en-IN" dirty="0"/>
+          </a:p>
+          <a:p>
+            <a:pPr lvl="2"/>
+            <a:r>
+              <a:rPr lang="en-IN" dirty="0" err="1"/>
+              <a:t>MatchedRecords.json</a:t>
+            </a:r>
+            <a:endParaRPr lang="en-IN" dirty="0"/>
+          </a:p>
+          <a:p>
+            <a:pPr lvl="2"/>
+            <a:r>
+              <a:rPr lang="en-IN" dirty="0" err="1"/>
+              <a:t>UnMatchedInvcRecords.json</a:t>
+            </a:r>
+            <a:endParaRPr lang="en-IN" dirty="0"/>
+          </a:p>
+          <a:p>
+            <a:pPr lvl="2"/>
+            <a:r>
+              <a:rPr lang="en-IN" dirty="0" err="1"/>
+              <a:t>UnMatchedSumRecords.json</a:t>
+            </a:r>
+            <a:endParaRPr lang="en-IN" dirty="0"/>
+          </a:p>
+          <a:p>
+            <a:pPr lvl="2"/>
+            <a:endParaRPr lang="en-IN" dirty="0"/>
+          </a:p>
+          <a:p>
+            <a:pPr lvl="1"/>
+            <a:endParaRPr lang="en-IN" dirty="0"/>
+          </a:p>
+          <a:p>
+            <a:pPr lvl="1"/>
+            <a:endParaRPr lang="en-IN" dirty="0"/>
+          </a:p>
+          <a:p>
+            <a:pPr lvl="1"/>
+            <a:endParaRPr lang="en-IN" dirty="0"/>
+          </a:p>
+          <a:p>
+            <a:pPr lvl="1"/>
+            <a:endParaRPr lang="en-US" dirty="0"/>
+          </a:p>
+          <a:p>
+            <a:pPr lvl="1"/>
+            <a:endParaRPr lang="en-US" dirty="0"/>
+          </a:p>
+          <a:p>
+            <a:endParaRPr lang="en-US" dirty="0"/>
+          </a:p>
         </p:txBody>
       </p:sp>
+      <p:pic>
+        <p:nvPicPr>
+          <p:cNvPr id="11" name="Picture 10" descr="Text&#10;&#10;Description automatically generated">
+            <a:extLst>
+              <a:ext uri="{FF2B5EF4-FFF2-40B4-BE49-F238E27FC236}">
+                <a16:creationId xmlns:a16="http://schemas.microsoft.com/office/drawing/2014/main" id="{D579FA98-ED7E-6F42-90E3-E1440DBC2C2A}"/>
+              </a:ext>
+            </a:extLst>
+          </p:cNvPr>
+          <p:cNvPicPr>
+            <a:picLocks noChangeAspect="1"/>
+          </p:cNvPicPr>
+          <p:nvPr/>
+        </p:nvPicPr>
+        <p:blipFill>
+          <a:blip r:embed="rId4"/>
+          <a:stretch>
+            <a:fillRect/>
+          </a:stretch>
+        </p:blipFill>
+        <p:spPr>
+          <a:xfrm>
+            <a:off x="5033717" y="5439600"/>
+            <a:ext cx="6470892" cy="1418400"/>
+          </a:xfrm>
+          <a:prstGeom prst="rect">
+            <a:avLst/>
+          </a:prstGeom>
+        </p:spPr>
+      </p:pic>
+      <p:pic>
+        <p:nvPicPr>
+          <p:cNvPr id="15" name="Picture 14">
+            <a:extLst>
+              <a:ext uri="{FF2B5EF4-FFF2-40B4-BE49-F238E27FC236}">
+                <a16:creationId xmlns:a16="http://schemas.microsoft.com/office/drawing/2014/main" id="{26F958AA-1042-2B4A-885D-2C7F30050441}"/>
+              </a:ext>
+            </a:extLst>
+          </p:cNvPr>
+          <p:cNvPicPr>
+            <a:picLocks noChangeAspect="1"/>
+          </p:cNvPicPr>
+          <p:nvPr/>
+        </p:nvPicPr>
+        <p:blipFill>
+          <a:blip r:embed="rId5"/>
+          <a:stretch>
+            <a:fillRect/>
+          </a:stretch>
+        </p:blipFill>
+        <p:spPr>
+          <a:xfrm>
+            <a:off x="5029193" y="1894896"/>
+            <a:ext cx="6475417" cy="333098"/>
+          </a:xfrm>
+          <a:prstGeom prst="rect">
+            <a:avLst/>
+          </a:prstGeom>
+        </p:spPr>
+      </p:pic>
+      <p:pic>
+        <p:nvPicPr>
+          <p:cNvPr id="17" name="Picture 16" descr="Text&#10;&#10;Description automatically generated">
+            <a:extLst>
+              <a:ext uri="{FF2B5EF4-FFF2-40B4-BE49-F238E27FC236}">
+                <a16:creationId xmlns:a16="http://schemas.microsoft.com/office/drawing/2014/main" id="{06D4F832-62E3-6B4B-B994-806E471328FA}"/>
+              </a:ext>
+            </a:extLst>
+          </p:cNvPr>
+          <p:cNvPicPr>
+            <a:picLocks noChangeAspect="1"/>
+          </p:cNvPicPr>
+          <p:nvPr/>
+        </p:nvPicPr>
+        <p:blipFill>
+          <a:blip r:embed="rId6"/>
+          <a:stretch>
+            <a:fillRect/>
+          </a:stretch>
+        </p:blipFill>
+        <p:spPr>
+          <a:xfrm>
+            <a:off x="5029193" y="2328106"/>
+            <a:ext cx="6470892" cy="1273557"/>
+          </a:xfrm>
+          <a:prstGeom prst="rect">
+            <a:avLst/>
+          </a:prstGeom>
+        </p:spPr>
+      </p:pic>
+      <p:pic>
+        <p:nvPicPr>
+          <p:cNvPr id="19" name="Picture 18" descr="Text&#10;&#10;Description automatically generated">
+            <a:extLst>
+              <a:ext uri="{FF2B5EF4-FFF2-40B4-BE49-F238E27FC236}">
+                <a16:creationId xmlns:a16="http://schemas.microsoft.com/office/drawing/2014/main" id="{77D4F86A-8CA1-A04B-B336-F0A61273A785}"/>
+              </a:ext>
+            </a:extLst>
+          </p:cNvPr>
+          <p:cNvPicPr>
+            <a:picLocks noChangeAspect="1"/>
+          </p:cNvPicPr>
+          <p:nvPr/>
+        </p:nvPicPr>
+        <p:blipFill>
+          <a:blip r:embed="rId7"/>
+          <a:stretch>
+            <a:fillRect/>
+          </a:stretch>
+        </p:blipFill>
+        <p:spPr>
+          <a:xfrm>
+            <a:off x="5096181" y="3688666"/>
+            <a:ext cx="6408429" cy="1165169"/>
+          </a:xfrm>
+          <a:prstGeom prst="rect">
+            <a:avLst/>
+          </a:prstGeom>
+        </p:spPr>
+      </p:pic>
     </p:spTree>
     <p:extLst>
       <p:ext uri="{BB962C8B-B14F-4D97-AF65-F5344CB8AC3E}">
-        <p14:creationId xmlns:p14="http://schemas.microsoft.com/office/powerpoint/2010/main" val="2654444928"/>
+        <p14:creationId xmlns:p14="http://schemas.microsoft.com/office/powerpoint/2010/main" val="1890537887"/>
       </p:ext>
     </p:extLst>
   </p:cSld>
@@ -8559,24 +9052,27 @@
         </p:nvSpPr>
         <p:spPr>
           <a:xfrm>
-            <a:off x="1608667" y="387044"/>
-            <a:ext cx="10447866" cy="1280890"/>
+            <a:off x="1543988" y="474210"/>
+            <a:ext cx="9870683" cy="979838"/>
           </a:xfrm>
         </p:spPr>
         <p:txBody>
           <a:bodyPr/>
           <a:lstStyle/>
           <a:p>
-            <a:endParaRPr lang="en-US" dirty="0"/>
+            <a:r>
+              <a:rPr lang="en-US" dirty="0"/>
+              <a:t>Database</a:t>
+            </a:r>
           </a:p>
         </p:txBody>
       </p:sp>
       <p:sp>
         <p:nvSpPr>
-          <p:cNvPr id="3" name="Content Placeholder 2">
+          <p:cNvPr id="13" name="Subtitle 12">
             <a:extLst>
               <a:ext uri="{FF2B5EF4-FFF2-40B4-BE49-F238E27FC236}">
-                <a16:creationId xmlns:a16="http://schemas.microsoft.com/office/drawing/2014/main" id="{1A5F025B-D545-6448-A4FE-43C664451943}"/>
+                <a16:creationId xmlns:a16="http://schemas.microsoft.com/office/drawing/2014/main" id="{E7FF2314-3026-4F42-B882-94ADFB9363AC}"/>
               </a:ext>
             </a:extLst>
           </p:cNvPr>
@@ -8584,27 +9080,199 @@
             <a:spLocks noGrp="1"/>
           </p:cNvSpPr>
           <p:nvPr>
-            <p:ph idx="1"/>
+            <p:ph type="subTitle" idx="4294967295"/>
           </p:nvPr>
         </p:nvSpPr>
         <p:spPr>
           <a:xfrm>
-            <a:off x="1608667" y="1667934"/>
-            <a:ext cx="10447866" cy="5190066"/>
+            <a:off x="687389" y="1265808"/>
+            <a:ext cx="4962582" cy="5479765"/>
           </a:xfrm>
         </p:spPr>
         <p:txBody>
-          <a:bodyPr/>
+          <a:bodyPr>
+            <a:normAutofit/>
+          </a:bodyPr>
           <a:lstStyle/>
           <a:p>
+            <a:r>
+              <a:rPr lang="en-US" dirty="0"/>
+              <a:t>Database Details</a:t>
+            </a:r>
+          </a:p>
+          <a:p>
+            <a:pPr lvl="1"/>
+            <a:r>
+              <a:rPr lang="en-US" dirty="0"/>
+              <a:t>Database: MySQL DB</a:t>
+            </a:r>
+          </a:p>
+          <a:p>
+            <a:pPr lvl="1"/>
+            <a:r>
+              <a:rPr lang="en-US" dirty="0"/>
+              <a:t>Python package: </a:t>
+            </a:r>
+            <a:r>
+              <a:rPr lang="en-US" dirty="0" err="1"/>
+              <a:t>pymysql</a:t>
+            </a:r>
             <a:endParaRPr lang="en-US" dirty="0"/>
           </a:p>
+          <a:p>
+            <a:pPr lvl="1"/>
+            <a:r>
+              <a:rPr lang="en-US" dirty="0"/>
+              <a:t>Database name: </a:t>
+            </a:r>
+            <a:r>
+              <a:rPr lang="en-IN" dirty="0" err="1"/>
+              <a:t>InvoiceDB</a:t>
+            </a:r>
+            <a:endParaRPr lang="en-IN" dirty="0"/>
+          </a:p>
+          <a:p>
+            <a:pPr lvl="1"/>
+            <a:r>
+              <a:rPr lang="en-US" dirty="0"/>
+              <a:t>Table name: </a:t>
+            </a:r>
+            <a:r>
+              <a:rPr lang="en-IN" dirty="0"/>
+              <a:t>INVOICETAB</a:t>
+            </a:r>
+          </a:p>
+          <a:p>
+            <a:pPr lvl="1"/>
+            <a:r>
+              <a:rPr lang="en-IN" dirty="0"/>
+              <a:t>Data Schema</a:t>
+            </a:r>
+          </a:p>
+          <a:p>
+            <a:pPr lvl="2"/>
+            <a:r>
+              <a:rPr lang="en-IN" dirty="0"/>
+              <a:t>Shown in the screen shot</a:t>
+            </a:r>
+          </a:p>
+          <a:p>
+            <a:pPr lvl="2"/>
+            <a:endParaRPr lang="en-IN" dirty="0"/>
+          </a:p>
+          <a:p>
+            <a:pPr lvl="1"/>
+            <a:endParaRPr lang="en-IN" dirty="0"/>
+          </a:p>
+          <a:p>
+            <a:pPr lvl="1"/>
+            <a:endParaRPr lang="en-IN" dirty="0"/>
+          </a:p>
+          <a:p>
+            <a:pPr lvl="1"/>
+            <a:endParaRPr lang="en-US" dirty="0"/>
+          </a:p>
+          <a:p>
+            <a:pPr lvl="1"/>
+            <a:endParaRPr lang="en-US" dirty="0"/>
+          </a:p>
+          <a:p>
+            <a:endParaRPr lang="en-US" dirty="0"/>
+          </a:p>
         </p:txBody>
       </p:sp>
+      <p:pic>
+        <p:nvPicPr>
+          <p:cNvPr id="25" name="Picture 24" descr="Table&#10;&#10;Description automatically generated">
+            <a:extLst>
+              <a:ext uri="{FF2B5EF4-FFF2-40B4-BE49-F238E27FC236}">
+                <a16:creationId xmlns:a16="http://schemas.microsoft.com/office/drawing/2014/main" id="{DA94F169-BA2C-9640-B4C1-48FD83E9358A}"/>
+              </a:ext>
+            </a:extLst>
+          </p:cNvPr>
+          <p:cNvPicPr>
+            <a:picLocks noChangeAspect="1"/>
+          </p:cNvPicPr>
+          <p:nvPr/>
+        </p:nvPicPr>
+        <p:blipFill>
+          <a:blip r:embed="rId2"/>
+          <a:stretch>
+            <a:fillRect/>
+          </a:stretch>
+        </p:blipFill>
+        <p:spPr>
+          <a:xfrm>
+            <a:off x="5649970" y="3780815"/>
+            <a:ext cx="6052966" cy="2964758"/>
+          </a:xfrm>
+          <a:prstGeom prst="rect">
+            <a:avLst/>
+          </a:prstGeom>
+        </p:spPr>
+      </p:pic>
+      <p:pic>
+        <p:nvPicPr>
+          <p:cNvPr id="29" name="Content Placeholder 28" descr="Graphical user interface, text, application&#10;&#10;Description automatically generated">
+            <a:extLst>
+              <a:ext uri="{FF2B5EF4-FFF2-40B4-BE49-F238E27FC236}">
+                <a16:creationId xmlns:a16="http://schemas.microsoft.com/office/drawing/2014/main" id="{DB0AD95B-7156-0B41-BF10-366CF5EA4B22}"/>
+              </a:ext>
+            </a:extLst>
+          </p:cNvPr>
+          <p:cNvPicPr>
+            <a:picLocks noGrp="1" noChangeAspect="1"/>
+          </p:cNvPicPr>
+          <p:nvPr>
+            <p:ph sz="half" idx="1"/>
+          </p:nvPr>
+        </p:nvPicPr>
+        <p:blipFill>
+          <a:blip r:embed="rId3"/>
+          <a:stretch>
+            <a:fillRect/>
+          </a:stretch>
+        </p:blipFill>
+        <p:spPr>
+          <a:xfrm>
+            <a:off x="5649970" y="1454048"/>
+            <a:ext cx="6052966" cy="2339627"/>
+          </a:xfrm>
+        </p:spPr>
+      </p:pic>
+      <p:pic>
+        <p:nvPicPr>
+          <p:cNvPr id="34" name="Content Placeholder 33" descr="Table&#10;&#10;Description automatically generated">
+            <a:extLst>
+              <a:ext uri="{FF2B5EF4-FFF2-40B4-BE49-F238E27FC236}">
+                <a16:creationId xmlns:a16="http://schemas.microsoft.com/office/drawing/2014/main" id="{4DA96A28-A78B-1C4F-8A85-74B66B24B13D}"/>
+              </a:ext>
+            </a:extLst>
+          </p:cNvPr>
+          <p:cNvPicPr>
+            <a:picLocks noGrp="1" noChangeAspect="1"/>
+          </p:cNvPicPr>
+          <p:nvPr>
+            <p:ph sz="half" idx="2"/>
+          </p:nvPr>
+        </p:nvPicPr>
+        <p:blipFill>
+          <a:blip r:embed="rId4"/>
+          <a:stretch>
+            <a:fillRect/>
+          </a:stretch>
+        </p:blipFill>
+        <p:spPr>
+          <a:xfrm>
+            <a:off x="1012061" y="4005690"/>
+            <a:ext cx="4313238" cy="1999407"/>
+          </a:xfrm>
+        </p:spPr>
+      </p:pic>
     </p:spTree>
     <p:extLst>
       <p:ext uri="{BB962C8B-B14F-4D97-AF65-F5344CB8AC3E}">
-        <p14:creationId xmlns:p14="http://schemas.microsoft.com/office/powerpoint/2010/main" val="1890537887"/>
+        <p14:creationId xmlns:p14="http://schemas.microsoft.com/office/powerpoint/2010/main" val="1124193870"/>
       </p:ext>
     </p:extLst>
   </p:cSld>
@@ -8712,7 +9380,7 @@
         </p:nvSpPr>
         <p:spPr>
           <a:xfrm>
-            <a:off x="1659467" y="624110"/>
+            <a:off x="1659467" y="489200"/>
             <a:ext cx="10363199" cy="1280890"/>
           </a:xfrm>
         </p:spPr>
@@ -8722,7 +9390,7 @@
           <a:p>
             <a:r>
               <a:rPr lang="en-US" dirty="0"/>
-              <a:t>Index Page - Front End HTML</a:t>
+              <a:t>Index Page – using python API</a:t>
             </a:r>
           </a:p>
         </p:txBody>
@@ -8756,13 +9424,13 @@
           <a:lstStyle/>
           <a:p>
             <a:r>
-              <a:rPr lang="en-US" dirty="0"/>
+              <a:rPr lang="en-US"/>
               <a:t>Results Displayed in Front End – Index Page for Invoice and Payment Matching Application: Rendered using Python Flask API - with POST, GET methods.</a:t>
             </a:r>
           </a:p>
           <a:p>
             <a:r>
-              <a:rPr lang="en-US" dirty="0"/>
+              <a:rPr lang="en-US"/>
               <a:t>URL:</a:t>
             </a:r>
           </a:p>
@@ -8771,50 +9439,44 @@
               <a:buNone/>
             </a:pPr>
             <a:r>
-              <a:rPr lang="en-US" dirty="0">
+              <a:rPr lang="en-US">
                 <a:hlinkClick r:id="rId2"/>
               </a:rPr>
-              <a:t>Index Page: </a:t>
-            </a:r>
-            <a:r>
-              <a:rPr lang="en-US" dirty="0">
-                <a:hlinkClick r:id="rId2"/>
-              </a:rPr>
-              <a:t>http://127.0.0.1:5000/Index</a:t>
-            </a:r>
-            <a:endParaRPr lang="en-US" dirty="0"/>
-          </a:p>
-          <a:p>
-            <a:r>
-              <a:rPr lang="en-US" dirty="0"/>
+              <a:t>Index Page: http://127.0.0.1:5000/Index</a:t>
+            </a:r>
+            <a:endParaRPr lang="en-US"/>
+          </a:p>
+          <a:p>
+            <a:r>
+              <a:rPr lang="en-US"/>
               <a:t>Index Page Includes List of Operations</a:t>
             </a:r>
           </a:p>
           <a:p>
             <a:pPr lvl="1"/>
             <a:r>
-              <a:rPr lang="en-US" dirty="0"/>
+              <a:rPr lang="en-US"/>
               <a:t>All Invoices and Payment Form</a:t>
             </a:r>
           </a:p>
           <a:p>
             <a:pPr lvl="1"/>
             <a:r>
-              <a:rPr lang="en-US" dirty="0"/>
+              <a:rPr lang="en-US"/>
               <a:t>All Matched Invoices &amp; Payments Form</a:t>
             </a:r>
           </a:p>
           <a:p>
             <a:pPr lvl="1"/>
             <a:r>
-              <a:rPr lang="en-US" dirty="0"/>
+              <a:rPr lang="en-US"/>
               <a:t>All Unmatched Invoices or Payments Form</a:t>
             </a:r>
           </a:p>
           <a:p>
             <a:pPr lvl="1"/>
             <a:r>
-              <a:rPr lang="en-US" dirty="0"/>
+              <a:rPr lang="en-US"/>
               <a:t>All Unmatched Invoices &amp; Payments Summary – Debit &amp; Credit Amounts Form</a:t>
             </a:r>
           </a:p>
@@ -8901,7 +9563,7 @@
         </p:nvSpPr>
         <p:spPr>
           <a:xfrm>
-            <a:off x="1591733" y="624110"/>
+            <a:off x="1591733" y="459220"/>
             <a:ext cx="10481733" cy="1280890"/>
           </a:xfrm>
         </p:spPr>
@@ -8910,9 +9572,10 @@
           <a:lstStyle/>
           <a:p>
             <a:r>
-              <a:rPr lang="en-US" dirty="0"/>
-              <a:t>All Records Page - Front End HTML</a:t>
-            </a:r>
+              <a:rPr lang="en-US"/>
+              <a:t>All Records Page - using python API</a:t>
+            </a:r>
+            <a:endParaRPr lang="en-US" dirty="0"/>
           </a:p>
         </p:txBody>
       </p:sp>
@@ -8982,7 +9645,7 @@
             <a:pPr lvl="1"/>
             <a:r>
               <a:rPr lang="en-US" dirty="0"/>
-              <a:t>The data pulled from INVOICETAB, converted to Data frame -&gt; Json file -&gt; then rendered json file o html </a:t>
+              <a:t>The data pulled from INVOICETAB, converted to Data frame -&gt; Json file -&gt; then rendered the json file to html </a:t>
             </a:r>
           </a:p>
         </p:txBody>
@@ -9064,18 +9727,21 @@
         </p:nvSpPr>
         <p:spPr>
           <a:xfrm>
-            <a:off x="1640157" y="590244"/>
-            <a:ext cx="9640882" cy="1280890"/>
+            <a:off x="1603947" y="470324"/>
+            <a:ext cx="10588053" cy="1280890"/>
           </a:xfrm>
         </p:spPr>
         <p:txBody>
-          <a:bodyPr/>
+          <a:bodyPr>
+            <a:normAutofit/>
+          </a:bodyPr>
           <a:lstStyle/>
           <a:p>
             <a:r>
-              <a:rPr lang="en-US" dirty="0"/>
-              <a:t>Matched Invoices Page  - Front End HTML</a:t>
-            </a:r>
+              <a:rPr lang="en-US"/>
+              <a:t>Matched Invoices Page  - using python API</a:t>
+            </a:r>
+            <a:endParaRPr lang="en-US" dirty="0"/>
           </a:p>
         </p:txBody>
       </p:sp>
@@ -9103,13 +9769,13 @@
         </p:spPr>
         <p:txBody>
           <a:bodyPr>
-            <a:normAutofit lnSpcReduction="10000"/>
+            <a:normAutofit fontScale="92500"/>
           </a:bodyPr>
           <a:lstStyle/>
           <a:p>
             <a:r>
               <a:rPr lang="en-US" dirty="0"/>
-              <a:t>Matched Invoices Page – List of all the Matched Invoices data records loaded to database from the Input CSV data – Rendered using Python Flask API - with POST, GET methods.</a:t>
+              <a:t>Matched Invoices Page – List of all the Matched Invoices associated based on LETTERING Ids– Rendered using Python Flask API - with POST, GET methods to display in html page.</a:t>
             </a:r>
           </a:p>
           <a:p>
@@ -9131,21 +9797,21 @@
           <a:p>
             <a:r>
               <a:rPr lang="en-US" dirty="0"/>
-              <a:t>All Records - List of Operations</a:t>
+              <a:t>Matched Invoices - List of Operations</a:t>
             </a:r>
           </a:p>
           <a:p>
             <a:pPr lvl="1"/>
             <a:r>
               <a:rPr lang="en-US" dirty="0"/>
-              <a:t>List of All matched Invoices and Payments by Debit and Credit Amounts processed from the data retrieved from the database table – INVOICETAB</a:t>
+              <a:t>List of All matched Invoices and Payments by Debit and Credit Amounts associated by LETTERING IDs processed from the data retrieved from the database table – INVOICETAB</a:t>
             </a:r>
           </a:p>
           <a:p>
             <a:pPr lvl="1"/>
             <a:r>
               <a:rPr lang="en-US" dirty="0"/>
-              <a:t>The matched Invoice data pulled from INVOICETAB, converted to Data frame -&gt; Json file -&gt; then rendered json file o html </a:t>
+              <a:t>The matched Invoice data pulled from INVOICETAB, converted to Data frame -&gt; Json file -&gt; then rendered the json file to html </a:t>
             </a:r>
           </a:p>
         </p:txBody>
@@ -9225,15 +9891,21 @@
             <p:ph type="title"/>
           </p:nvPr>
         </p:nvSpPr>
-        <p:spPr/>
+        <p:spPr>
+          <a:xfrm>
+            <a:off x="1603948" y="444230"/>
+            <a:ext cx="10469519" cy="1280890"/>
+          </a:xfrm>
+        </p:spPr>
         <p:txBody>
           <a:bodyPr/>
           <a:lstStyle/>
           <a:p>
             <a:r>
-              <a:rPr lang="en-US" dirty="0"/>
-              <a:t>All Records Page - Front End HTML</a:t>
-            </a:r>
+              <a:rPr lang="en-US"/>
+              <a:t>Unmatched Invoices Page – using python API</a:t>
+            </a:r>
+            <a:endParaRPr lang="en-US" dirty="0"/>
           </a:p>
         </p:txBody>
       </p:sp>
@@ -9261,19 +9933,19 @@
         </p:spPr>
         <p:txBody>
           <a:bodyPr>
-            <a:normAutofit/>
+            <a:normAutofit fontScale="92500" lnSpcReduction="20000"/>
           </a:bodyPr>
           <a:lstStyle/>
           <a:p>
             <a:r>
               <a:rPr lang="en-US" dirty="0"/>
-              <a:t>All Records Page – List of all the data records loaded to database from the Input CSV data – Rendered using Python Flask API - with POST, GET methods.</a:t>
+              <a:t>Unmatched Invoices Page – List of all the Unmatched Invoices order by RECOVERY – Rendered using Python Flask API - with POST, GET methods to display in html page.</a:t>
             </a:r>
           </a:p>
           <a:p>
             <a:r>
               <a:rPr lang="en-US" dirty="0"/>
-              <a:t>URL:  All records Page: </a:t>
+              <a:t>URL:  Unmatched Invoices Page: </a:t>
             </a:r>
           </a:p>
           <a:p>
@@ -9282,38 +9954,46 @@
               <a:rPr lang="en-US" dirty="0">
                 <a:hlinkClick r:id="rId2"/>
               </a:rPr>
-              <a:t>http://127.0.0.1:5000/All</a:t>
+              <a:t>http://127.0.0.1:5000/UnmatchedInvoices</a:t>
             </a:r>
             <a:endParaRPr lang="en-US" dirty="0"/>
           </a:p>
           <a:p>
             <a:r>
               <a:rPr lang="en-US" dirty="0"/>
-              <a:t>All Records - List of Operations</a:t>
+              <a:t>Unmatched Invoices- List of Operations</a:t>
             </a:r>
           </a:p>
           <a:p>
             <a:pPr lvl="1"/>
             <a:r>
               <a:rPr lang="en-US" dirty="0"/>
-              <a:t>List of All the records from the database table – INVOICETAB</a:t>
+              <a:t>List of All Unmatched Invoices and Payments by Debit and Credit Amounts group by Invoice_no order by recovery (Due – Echu , Not Due – Non </a:t>
+            </a:r>
+            <a:r>
+              <a:rPr lang="en-US" dirty="0" err="1"/>
+              <a:t>échu</a:t>
+            </a:r>
+            <a:r>
+              <a:rPr lang="en-US" dirty="0"/>
+              <a:t>, none/blank), for the data retrieved from the database table – INVOICETAB</a:t>
             </a:r>
           </a:p>
           <a:p>
             <a:pPr lvl="1"/>
             <a:r>
               <a:rPr lang="en-US" dirty="0"/>
-              <a:t>The data pulled from INVOICETAB, converted to Data frame -&gt; Json file -&gt; then rendered json file o html </a:t>
+              <a:t>The data pulled from INVOICETAB, processed using unmatched invoices business logic, converted to Data frame -&gt; Json file -&gt; then rendered the json file to html </a:t>
             </a:r>
           </a:p>
         </p:txBody>
       </p:sp>
       <p:pic>
         <p:nvPicPr>
-          <p:cNvPr id="8" name="Content Placeholder 7" descr="Table&#10;&#10;Description automatically generated">
+          <p:cNvPr id="11" name="Content Placeholder 10" descr="Graphical user interface, application, table&#10;&#10;Description automatically generated">
             <a:extLst>
               <a:ext uri="{FF2B5EF4-FFF2-40B4-BE49-F238E27FC236}">
-                <a16:creationId xmlns:a16="http://schemas.microsoft.com/office/drawing/2014/main" id="{1B1FC8BB-5038-D74B-9C09-18FB16D5170C}"/>
+                <a16:creationId xmlns:a16="http://schemas.microsoft.com/office/drawing/2014/main" id="{E33228F4-67AB-6245-8669-2A3C6685376C}"/>
               </a:ext>
             </a:extLst>
           </p:cNvPr>
@@ -9332,8 +10012,8 @@
         </p:blipFill>
         <p:spPr>
           <a:xfrm>
-            <a:off x="5452532" y="1422401"/>
-            <a:ext cx="6620935" cy="5249332"/>
+            <a:off x="5833872" y="1422401"/>
+            <a:ext cx="6239595" cy="5249332"/>
           </a:xfrm>
         </p:spPr>
       </p:pic>
@@ -9383,14 +10063,19 @@
             <p:ph type="title"/>
           </p:nvPr>
         </p:nvSpPr>
-        <p:spPr/>
+        <p:spPr>
+          <a:xfrm>
+            <a:off x="1603948" y="444230"/>
+            <a:ext cx="10469519" cy="1280890"/>
+          </a:xfrm>
+        </p:spPr>
         <p:txBody>
           <a:bodyPr/>
           <a:lstStyle/>
           <a:p>
             <a:r>
               <a:rPr lang="en-US" dirty="0"/>
-              <a:t>All Records Page - Front End HTML</a:t>
+              <a:t>Unmatched Summary – using python API</a:t>
             </a:r>
           </a:p>
         </p:txBody>
@@ -9419,19 +10104,19 @@
         </p:spPr>
         <p:txBody>
           <a:bodyPr>
-            <a:normAutofit/>
+            <a:normAutofit fontScale="92500" lnSpcReduction="20000"/>
           </a:bodyPr>
           <a:lstStyle/>
           <a:p>
             <a:r>
               <a:rPr lang="en-US" dirty="0"/>
-              <a:t>All Records Page – List of all the data records loaded to database from the Input CSV data – Rendered using Python Flask API - with POST, GET methods.</a:t>
+              <a:t>Unmatched summary Page – List of all the Unmatched summary of records  group by RECOVERY – Rendered using Python Flask API - with POST, GET methods to display in html page.</a:t>
             </a:r>
           </a:p>
           <a:p>
             <a:r>
               <a:rPr lang="en-US" dirty="0"/>
-              <a:t>URL:  All records Page: </a:t>
+              <a:t>URL:  Unmatched Invoices Page: </a:t>
             </a:r>
           </a:p>
           <a:p>
@@ -9440,38 +10125,46 @@
               <a:rPr lang="en-US" dirty="0">
                 <a:hlinkClick r:id="rId2"/>
               </a:rPr>
-              <a:t>http://127.0.0.1:5000/All</a:t>
+              <a:t>http://127.0.0.1:5000/UnmatchedSummary</a:t>
             </a:r>
             <a:endParaRPr lang="en-US" dirty="0"/>
           </a:p>
           <a:p>
             <a:r>
               <a:rPr lang="en-US" dirty="0"/>
-              <a:t>All Records - List of Operations</a:t>
+              <a:t>Unmatched Summary - List of Operations</a:t>
             </a:r>
           </a:p>
           <a:p>
             <a:pPr lvl="1"/>
             <a:r>
               <a:rPr lang="en-US" dirty="0"/>
-              <a:t>List of All the records from the database table – INVOICETAB</a:t>
+              <a:t>List of All Unmatched summary of Debit and Credit Amounts group by by recovery (Due – Echu , Not Due – Non </a:t>
+            </a:r>
+            <a:r>
+              <a:rPr lang="en-US" dirty="0" err="1"/>
+              <a:t>échu</a:t>
+            </a:r>
+            <a:r>
+              <a:rPr lang="en-US" dirty="0"/>
+              <a:t>, none/blank) for the data retrieved from the database table – INVOICETAB</a:t>
             </a:r>
           </a:p>
           <a:p>
             <a:pPr lvl="1"/>
             <a:r>
               <a:rPr lang="en-US" dirty="0"/>
-              <a:t>The data pulled from INVOICETAB, converted to Data frame -&gt; Json file -&gt; then rendered json file o html </a:t>
+              <a:t>The data pulled from INVOICETAB, processed using unmatched summary business logic, converted to Data frame -&gt; Json file -&gt; then rendered the json file to html </a:t>
             </a:r>
           </a:p>
         </p:txBody>
       </p:sp>
       <p:pic>
         <p:nvPicPr>
-          <p:cNvPr id="8" name="Content Placeholder 7" descr="Table&#10;&#10;Description automatically generated">
+          <p:cNvPr id="7" name="Content Placeholder 6" descr="Graphical user interface, text, application&#10;&#10;Description automatically generated">
             <a:extLst>
               <a:ext uri="{FF2B5EF4-FFF2-40B4-BE49-F238E27FC236}">
-                <a16:creationId xmlns:a16="http://schemas.microsoft.com/office/drawing/2014/main" id="{1B1FC8BB-5038-D74B-9C09-18FB16D5170C}"/>
+                <a16:creationId xmlns:a16="http://schemas.microsoft.com/office/drawing/2014/main" id="{42631356-5F83-6844-901E-34C1F1B27219}"/>
               </a:ext>
             </a:extLst>
           </p:cNvPr>
@@ -9490,15 +10183,15 @@
         </p:blipFill>
         <p:spPr>
           <a:xfrm>
-            <a:off x="5452532" y="1422401"/>
-            <a:ext cx="6620935" cy="5249332"/>
+            <a:off x="5588000" y="2373964"/>
+            <a:ext cx="6485467" cy="2234612"/>
           </a:xfrm>
         </p:spPr>
       </p:pic>
     </p:spTree>
     <p:extLst>
       <p:ext uri="{BB962C8B-B14F-4D97-AF65-F5344CB8AC3E}">
-        <p14:creationId xmlns:p14="http://schemas.microsoft.com/office/powerpoint/2010/main" val="3419191966"/>
+        <p14:creationId xmlns:p14="http://schemas.microsoft.com/office/powerpoint/2010/main" val="3090917955"/>
       </p:ext>
     </p:extLst>
   </p:cSld>
@@ -9530,7 +10223,7 @@
           <p:cNvPr id="2" name="Title 1">
             <a:extLst>
               <a:ext uri="{FF2B5EF4-FFF2-40B4-BE49-F238E27FC236}">
-                <a16:creationId xmlns:a16="http://schemas.microsoft.com/office/drawing/2014/main" id="{0FF987D5-29A9-C14B-A038-FBE8D807294D}"/>
+                <a16:creationId xmlns:a16="http://schemas.microsoft.com/office/drawing/2014/main" id="{A8E1D046-7780-744E-9AFF-143A5D280478}"/>
               </a:ext>
             </a:extLst>
           </p:cNvPr>
@@ -9543,8 +10236,8 @@
         </p:nvSpPr>
         <p:spPr>
           <a:xfrm>
-            <a:off x="1608667" y="556378"/>
-            <a:ext cx="10244663" cy="1272422"/>
+            <a:off x="1591734" y="624110"/>
+            <a:ext cx="9912878" cy="1280890"/>
           </a:xfrm>
         </p:spPr>
         <p:txBody>
@@ -9553,7 +10246,7 @@
           <a:p>
             <a:r>
               <a:rPr lang="en-US" dirty="0"/>
-              <a:t>Future Scope</a:t>
+              <a:t>Lesson’s Learned</a:t>
             </a:r>
           </a:p>
         </p:txBody>
@@ -9563,7 +10256,7 @@
           <p:cNvPr id="3" name="Content Placeholder 2">
             <a:extLst>
               <a:ext uri="{FF2B5EF4-FFF2-40B4-BE49-F238E27FC236}">
-                <a16:creationId xmlns:a16="http://schemas.microsoft.com/office/drawing/2014/main" id="{C36C3C7F-FF80-C04D-887E-6A04B8D87A56}"/>
+                <a16:creationId xmlns:a16="http://schemas.microsoft.com/office/drawing/2014/main" id="{884AC71E-30E1-2C4C-B0BE-BC914318EC2F}"/>
               </a:ext>
             </a:extLst>
           </p:cNvPr>
@@ -9576,13 +10269,13 @@
         </p:nvSpPr>
         <p:spPr>
           <a:xfrm>
-            <a:off x="1608668" y="1286934"/>
-            <a:ext cx="5096932" cy="5571066"/>
+            <a:off x="1896533" y="1371600"/>
+            <a:ext cx="5006543" cy="5486399"/>
           </a:xfrm>
         </p:spPr>
         <p:txBody>
           <a:bodyPr>
-            <a:normAutofit fontScale="92500" lnSpcReduction="10000"/>
+            <a:normAutofit lnSpcReduction="10000"/>
           </a:bodyPr>
           <a:lstStyle/>
           <a:p>
@@ -9591,76 +10284,27 @@
             </a:pPr>
             <a:r>
               <a:rPr lang="en-US" b="1" dirty="0"/>
-              <a:t>Within Scope</a:t>
-            </a:r>
-          </a:p>
-          <a:p>
+              <a:t>Requirement Analysis</a:t>
+            </a:r>
             <a:r>
               <a:rPr lang="en-US" dirty="0"/>
-              <a:t>Matched Invoices </a:t>
-            </a:r>
-          </a:p>
-          <a:p>
-            <a:pPr lvl="1"/>
-            <a:r>
-              <a:rPr lang="en-IN" dirty="0"/>
-              <a:t>Invoice: Debit type transaction</a:t>
-            </a:r>
-            <a:br>
-              <a:rPr lang="en-IN" dirty="0"/>
-            </a:br>
-            <a:r>
-              <a:rPr lang="en-IN" dirty="0"/>
-              <a:t>Payment: Credit type transaction</a:t>
-            </a:r>
-            <a:br>
-              <a:rPr lang="en-IN" dirty="0"/>
-            </a:br>
-            <a:r>
-              <a:rPr lang="en-IN" dirty="0"/>
-              <a:t>Transaction association (lettering) is only done between balanced credit and debit type transactions</a:t>
-            </a:r>
-            <a:br>
-              <a:rPr lang="en-IN" dirty="0"/>
-            </a:br>
-            <a:r>
-              <a:rPr lang="en-IN" dirty="0"/>
-              <a:t>Example:</a:t>
-            </a:r>
-            <a:br>
-              <a:rPr lang="en-IN" dirty="0"/>
-            </a:br>
-            <a:r>
-              <a:rPr lang="en-IN" dirty="0"/>
-              <a:t>Ex: </a:t>
-            </a:r>
-          </a:p>
-          <a:p>
-            <a:pPr lvl="2"/>
-            <a:r>
-              <a:rPr lang="en-IN" dirty="0"/>
-              <a:t>1 invoice of 10€ and 1 payment of 10€.</a:t>
-            </a:r>
-          </a:p>
-          <a:p>
-            <a:pPr lvl="2"/>
-            <a:r>
-              <a:rPr lang="en-IN" dirty="0"/>
-              <a:t>2 invoices of 10€ and 1 payment of 20€.</a:t>
-            </a:r>
-          </a:p>
-          <a:p>
-            <a:pPr lvl="2"/>
-            <a:r>
-              <a:rPr lang="en-IN" dirty="0"/>
-              <a:t>2 invoices of 10€ and 2 payments of 10€.</a:t>
-            </a:r>
-          </a:p>
-          <a:p>
-            <a:pPr lvl="2"/>
-            <a:r>
-              <a:rPr lang="en-IN" dirty="0"/>
-              <a:t>1 invoice of 10€ and 2 payments of 5€ each</a:t>
+              <a:t> </a:t>
+            </a:r>
+          </a:p>
+          <a:p>
+            <a:r>
+              <a:rPr lang="en-US" dirty="0"/>
+              <a:t>Clearly addressed requirement gaps. – In/out of scope. </a:t>
+            </a:r>
+          </a:p>
+          <a:p>
+            <a:r>
+              <a:rPr lang="en-US" dirty="0"/>
+              <a:t>Additional enhancement requirement questions – Data Security, User authentications, Functionality </a:t>
+            </a:r>
+            <a:r>
+              <a:rPr lang="en-US" dirty="0" err="1"/>
+              <a:t>etc</a:t>
             </a:r>
             <a:endParaRPr lang="en-US" dirty="0"/>
           </a:p>
@@ -9670,28 +10314,30 @@
             </a:pPr>
             <a:r>
               <a:rPr lang="en-US" b="1" dirty="0"/>
-              <a:t>Out of Scope: </a:t>
-            </a:r>
+              <a:t>Development Best practices</a:t>
+            </a:r>
+            <a:endParaRPr lang="en-US" dirty="0"/>
           </a:p>
           <a:p>
             <a:r>
               <a:rPr lang="en-US" dirty="0"/>
-              <a:t>No 30way matching between Order, Invoice, and Payments  - Requirement to  match only between DEBIT and credit amounts.</a:t>
+              <a:t>Enhanced Standard Implementation practices with the efficient usage of python packages.</a:t>
             </a:r>
           </a:p>
           <a:p>
             <a:r>
               <a:rPr lang="en-US" dirty="0"/>
-              <a:t>No Invoice detail(line) level matching (SKUs, Quantities </a:t>
-            </a:r>
-            <a:r>
-              <a:rPr lang="en-US" dirty="0" err="1"/>
-              <a:t>etc</a:t>
-            </a:r>
+              <a:t>Thorough research and study with the usage of efficient process logic in the implementation to transfer the json data directly into python flask API to get and post the messages to the front-end app.</a:t>
+            </a:r>
+          </a:p>
+          <a:p>
             <a:r>
               <a:rPr lang="en-US" dirty="0"/>
-              <a:t>)</a:t>
-            </a:r>
+              <a:t>Deployment of code in the application server or cloud.</a:t>
+            </a:r>
+          </a:p>
+          <a:p>
+            <a:endParaRPr lang="en-US" dirty="0"/>
           </a:p>
         </p:txBody>
       </p:sp>
@@ -9700,7 +10346,7 @@
           <p:cNvPr id="4" name="Content Placeholder 3">
             <a:extLst>
               <a:ext uri="{FF2B5EF4-FFF2-40B4-BE49-F238E27FC236}">
-                <a16:creationId xmlns:a16="http://schemas.microsoft.com/office/drawing/2014/main" id="{6178AACC-03F6-C147-88E3-31618D7AE459}"/>
+                <a16:creationId xmlns:a16="http://schemas.microsoft.com/office/drawing/2014/main" id="{E58FC68A-904E-4D4D-8AEB-E9C0F6328A03}"/>
               </a:ext>
             </a:extLst>
           </p:cNvPr>
@@ -9713,13 +10359,13 @@
         </p:nvSpPr>
         <p:spPr>
           <a:xfrm>
-            <a:off x="7044267" y="1286932"/>
-            <a:ext cx="4809064" cy="5571066"/>
+            <a:off x="7190747" y="1236133"/>
+            <a:ext cx="4781120" cy="5621867"/>
           </a:xfrm>
         </p:spPr>
         <p:txBody>
           <a:bodyPr>
-            <a:normAutofit fontScale="92500" lnSpcReduction="10000"/>
+            <a:normAutofit lnSpcReduction="10000"/>
           </a:bodyPr>
           <a:lstStyle/>
           <a:p>
@@ -9728,72 +10374,24 @@
             </a:pPr>
             <a:r>
               <a:rPr lang="en-US" b="1" dirty="0"/>
-              <a:t>Additional Enhancements Included:</a:t>
-            </a:r>
+              <a:t>Future Enhancements work:</a:t>
+            </a:r>
+            <a:endParaRPr lang="en-US" dirty="0"/>
           </a:p>
           <a:p>
             <a:r>
               <a:rPr lang="en-US" dirty="0"/>
-              <a:t>Unmatched Invoices/payments of Debit &amp; Credit Amounts – Order by Recovery ((Due. - Echu, Not Due – Non-</a:t>
-            </a:r>
-            <a:r>
-              <a:rPr lang="en-US" dirty="0" err="1"/>
-              <a:t>échu</a:t>
-            </a:r>
-            <a:r>
-              <a:rPr lang="en-US" dirty="0"/>
-              <a:t>, Blank)</a:t>
-            </a:r>
-          </a:p>
-          <a:p>
-            <a:r>
-              <a:rPr lang="en-US" dirty="0"/>
-              <a:t>Unmatched Summary of DEBIT &amp; Credit Amounts – Group by Recovery. (Due. - Echu, Not Due – Non-</a:t>
-            </a:r>
-            <a:r>
-              <a:rPr lang="en-US" dirty="0" err="1"/>
-              <a:t>échu</a:t>
-            </a:r>
-            <a:r>
-              <a:rPr lang="en-US" dirty="0"/>
-              <a:t>, Blank)</a:t>
-            </a:r>
+              <a:t>Understand any Business process enhancement requirements from the users.</a:t>
+            </a:r>
+          </a:p>
+          <a:p>
+            <a:endParaRPr lang="en-US" dirty="0"/>
           </a:p>
           <a:p>
             <a:pPr marL="0" indent="0">
               <a:buNone/>
             </a:pPr>
-            <a:endParaRPr lang="en-US" b="1" dirty="0"/>
-          </a:p>
-          <a:p>
-            <a:pPr marL="0" indent="0">
-              <a:buNone/>
-            </a:pPr>
-            <a:r>
-              <a:rPr lang="en-US" b="1" dirty="0"/>
-              <a:t>Further Enhancements Scope:</a:t>
-            </a:r>
-          </a:p>
-          <a:p>
-            <a:pPr marL="0" indent="0">
-              <a:buNone/>
-            </a:pPr>
-            <a:r>
-              <a:rPr lang="en-US" dirty="0"/>
-              <a:t>This project can  be enhanced for future requirements</a:t>
-            </a:r>
-          </a:p>
-          <a:p>
-            <a:r>
-              <a:rPr lang="en-US" dirty="0"/>
-              <a:t>This can be enhanced for future requirements like  - 3 or 4-Way Matching - If additional details are provided ( Order Information, Shipment, Invoice and Payments)</a:t>
-            </a:r>
-          </a:p>
-          <a:p>
-            <a:r>
-              <a:rPr lang="en-US" dirty="0"/>
-              <a:t>Matched and Unmatched Detail level Matching ( SKUs, and Quantities)</a:t>
-            </a:r>
+            <a:endParaRPr lang="en-US" dirty="0"/>
           </a:p>
           <a:p>
             <a:endParaRPr lang="en-US" dirty="0"/>
@@ -9803,7 +10401,7 @@
     </p:spTree>
     <p:extLst>
       <p:ext uri="{BB962C8B-B14F-4D97-AF65-F5344CB8AC3E}">
-        <p14:creationId xmlns:p14="http://schemas.microsoft.com/office/powerpoint/2010/main" val="819744658"/>
+        <p14:creationId xmlns:p14="http://schemas.microsoft.com/office/powerpoint/2010/main" val="369180894"/>
       </p:ext>
     </p:extLst>
   </p:cSld>
@@ -9835,7 +10433,7 @@
           <p:cNvPr id="2" name="Title 1">
             <a:extLst>
               <a:ext uri="{FF2B5EF4-FFF2-40B4-BE49-F238E27FC236}">
-                <a16:creationId xmlns:a16="http://schemas.microsoft.com/office/drawing/2014/main" id="{D4622968-4082-3748-82F2-052EDEA9ED00}"/>
+                <a16:creationId xmlns:a16="http://schemas.microsoft.com/office/drawing/2014/main" id="{0FF987D5-29A9-C14B-A038-FBE8D807294D}"/>
               </a:ext>
             </a:extLst>
           </p:cNvPr>
@@ -9846,24 +10444,29 @@
             <p:ph type="title"/>
           </p:nvPr>
         </p:nvSpPr>
-        <p:spPr/>
+        <p:spPr>
+          <a:xfrm>
+            <a:off x="1608667" y="556378"/>
+            <a:ext cx="10244663" cy="1272422"/>
+          </a:xfrm>
+        </p:spPr>
         <p:txBody>
           <a:bodyPr/>
           <a:lstStyle/>
           <a:p>
             <a:r>
               <a:rPr lang="en-US" dirty="0"/>
-              <a:t>Thank you</a:t>
+              <a:t>Future Scope</a:t>
             </a:r>
           </a:p>
         </p:txBody>
       </p:sp>
       <p:sp>
         <p:nvSpPr>
-          <p:cNvPr id="3" name="Text Placeholder 2">
+          <p:cNvPr id="3" name="Content Placeholder 2">
             <a:extLst>
               <a:ext uri="{FF2B5EF4-FFF2-40B4-BE49-F238E27FC236}">
-                <a16:creationId xmlns:a16="http://schemas.microsoft.com/office/drawing/2014/main" id="{3E2E07F3-1428-7D4B-BC55-3D00EEFAC808}"/>
+                <a16:creationId xmlns:a16="http://schemas.microsoft.com/office/drawing/2014/main" id="{C36C3C7F-FF80-C04D-887E-6A04B8D87A56}"/>
               </a:ext>
             </a:extLst>
           </p:cNvPr>
@@ -9871,27 +10474,136 @@
             <a:spLocks noGrp="1"/>
           </p:cNvSpPr>
           <p:nvPr>
-            <p:ph type="body" sz="quarter" idx="13"/>
+            <p:ph sz="half" idx="1"/>
           </p:nvPr>
         </p:nvSpPr>
-        <p:spPr/>
+        <p:spPr>
+          <a:xfrm>
+            <a:off x="1608668" y="1286934"/>
+            <a:ext cx="5096932" cy="5571066"/>
+          </a:xfrm>
+        </p:spPr>
         <p:txBody>
-          <a:bodyPr/>
+          <a:bodyPr>
+            <a:normAutofit fontScale="85000" lnSpcReduction="20000"/>
+          </a:bodyPr>
           <a:lstStyle/>
           <a:p>
+            <a:pPr marL="0" indent="0">
+              <a:buNone/>
+            </a:pPr>
+            <a:r>
+              <a:rPr lang="en-US" b="1" dirty="0"/>
+              <a:t>Within Scope</a:t>
+            </a:r>
+          </a:p>
+          <a:p>
             <a:r>
               <a:rPr lang="en-US" dirty="0"/>
-              <a:t>- Suresh CHINNA SHANMUGAM</a:t>
+              <a:t>Matched Invoices </a:t>
+            </a:r>
+          </a:p>
+          <a:p>
+            <a:pPr lvl="1"/>
+            <a:r>
+              <a:rPr lang="en-IN" dirty="0"/>
+              <a:t>Invoice: Debit type transaction</a:t>
+            </a:r>
+            <a:br>
+              <a:rPr lang="en-IN" dirty="0"/>
+            </a:br>
+            <a:r>
+              <a:rPr lang="en-IN" dirty="0"/>
+              <a:t>Payment: Credit type transaction</a:t>
+            </a:r>
+            <a:br>
+              <a:rPr lang="en-IN" dirty="0"/>
+            </a:br>
+            <a:r>
+              <a:rPr lang="en-IN" dirty="0"/>
+              <a:t>Transaction association (lettering) is only done between balanced credit and debit type transactions</a:t>
+            </a:r>
+            <a:br>
+              <a:rPr lang="en-IN" dirty="0"/>
+            </a:br>
+            <a:r>
+              <a:rPr lang="en-IN" dirty="0"/>
+              <a:t>Example:</a:t>
+            </a:r>
+            <a:br>
+              <a:rPr lang="en-IN" dirty="0"/>
+            </a:br>
+            <a:r>
+              <a:rPr lang="en-IN" dirty="0"/>
+              <a:t>Ex: </a:t>
+            </a:r>
+          </a:p>
+          <a:p>
+            <a:pPr lvl="2"/>
+            <a:r>
+              <a:rPr lang="en-IN" dirty="0"/>
+              <a:t>1 invoice of 10€ and 1 payment of 10€.</a:t>
+            </a:r>
+          </a:p>
+          <a:p>
+            <a:pPr lvl="2"/>
+            <a:r>
+              <a:rPr lang="en-IN" dirty="0"/>
+              <a:t>2 invoices of 10€ and 1 payment of 20€.</a:t>
+            </a:r>
+          </a:p>
+          <a:p>
+            <a:pPr lvl="2"/>
+            <a:r>
+              <a:rPr lang="en-IN" dirty="0"/>
+              <a:t>2 invoices of 10€ and 2 payments of 10€.</a:t>
+            </a:r>
+          </a:p>
+          <a:p>
+            <a:pPr lvl="2"/>
+            <a:r>
+              <a:rPr lang="en-IN" dirty="0"/>
+              <a:t>1 invoice of 10€ and 2 payments of 5€ each</a:t>
+            </a:r>
+            <a:endParaRPr lang="en-US" dirty="0"/>
+          </a:p>
+          <a:p>
+            <a:pPr marL="0" indent="0">
+              <a:buNone/>
+            </a:pPr>
+            <a:r>
+              <a:rPr lang="en-US" b="1" dirty="0"/>
+              <a:t>Out of Scope: </a:t>
+            </a:r>
+          </a:p>
+          <a:p>
+            <a:r>
+              <a:rPr lang="en-US" dirty="0"/>
+              <a:t>No 30way matching between Order, Invoice, and Payments  - Requirement to  match only between DEBIT and credit amounts.</a:t>
+            </a:r>
+          </a:p>
+          <a:p>
+            <a:r>
+              <a:rPr lang="en-US" dirty="0"/>
+              <a:t>No Invoice detail(line) level matching (SKUs, Quantities </a:t>
+            </a:r>
+            <a:r>
+              <a:rPr lang="en-US" dirty="0" err="1"/>
+              <a:t>etc</a:t>
+            </a:r>
+            <a:r>
+              <a:rPr lang="en-US" dirty="0"/>
+              <a:t>)</a:t>
             </a:r>
           </a:p>
         </p:txBody>
       </p:sp>
       <p:sp>
         <p:nvSpPr>
-          <p:cNvPr id="4" name="Text Placeholder 3">
+          <p:cNvPr id="4" name="Content Placeholder 3">
             <a:extLst>
               <a:ext uri="{FF2B5EF4-FFF2-40B4-BE49-F238E27FC236}">
-                <a16:creationId xmlns:a16="http://schemas.microsoft.com/office/drawing/2014/main" id="{1018D8BC-E493-7449-8A87-252F3349C857}"/>
+                <a16:creationId xmlns:a16="http://schemas.microsoft.com/office/drawing/2014/main" id="{6178AACC-03F6-C147-88E3-31618D7AE459}"/>
               </a:ext>
             </a:extLst>
           </p:cNvPr>
@@ -9899,33 +10611,128 @@
             <a:spLocks noGrp="1"/>
           </p:cNvSpPr>
           <p:nvPr>
-            <p:ph type="body" sz="half" idx="2"/>
+            <p:ph sz="half" idx="2"/>
           </p:nvPr>
         </p:nvSpPr>
-        <p:spPr/>
+        <p:spPr>
+          <a:xfrm>
+            <a:off x="7044267" y="1286932"/>
+            <a:ext cx="4809064" cy="5571066"/>
+          </a:xfrm>
+        </p:spPr>
         <p:txBody>
           <a:bodyPr>
-            <a:normAutofit lnSpcReduction="10000"/>
+            <a:normAutofit fontScale="85000" lnSpcReduction="20000"/>
           </a:bodyPr>
           <a:lstStyle/>
           <a:p>
+            <a:pPr marL="0" indent="0">
+              <a:buNone/>
+            </a:pPr>
+            <a:r>
+              <a:rPr lang="en-US" b="1" dirty="0"/>
+              <a:t>Additional Enhancements Included:</a:t>
+            </a:r>
+          </a:p>
+          <a:p>
             <a:r>
               <a:rPr lang="en-US" dirty="0"/>
-              <a:t>- Email: suresh.cs0524@gmail.com</a:t>
-            </a:r>
-          </a:p>
-          <a:p>
+              <a:t>Unmatched Invoices/payments of Debit &amp; Credit Amounts – Order by Recovery ((Due. - Echu, Not Due – Non-</a:t>
+            </a:r>
+            <a:r>
+              <a:rPr lang="en-US" dirty="0" err="1"/>
+              <a:t>échu</a:t>
+            </a:r>
             <a:r>
               <a:rPr lang="en-US" dirty="0"/>
-              <a:t>- Mobile: +33 758072207</a:t>
-            </a:r>
+              <a:t>, Blank)</a:t>
+            </a:r>
+          </a:p>
+          <a:p>
+            <a:r>
+              <a:rPr lang="en-US" dirty="0"/>
+              <a:t>Unmatched Summary of DEBIT &amp; Credit Amounts – Group by Recovery. (Due. - Echu, Not Due – Non-</a:t>
+            </a:r>
+            <a:r>
+              <a:rPr lang="en-US" dirty="0" err="1"/>
+              <a:t>échu</a:t>
+            </a:r>
+            <a:r>
+              <a:rPr lang="en-US" dirty="0"/>
+              <a:t>, Blank)</a:t>
+            </a:r>
+          </a:p>
+          <a:p>
+            <a:pPr marL="0" indent="0">
+              <a:buNone/>
+            </a:pPr>
+            <a:endParaRPr lang="en-US" b="1" dirty="0"/>
+          </a:p>
+          <a:p>
+            <a:pPr marL="0" indent="0">
+              <a:buNone/>
+            </a:pPr>
+            <a:r>
+              <a:rPr lang="en-US" b="1" dirty="0"/>
+              <a:t>Further Enhancements Scope:</a:t>
+            </a:r>
+          </a:p>
+          <a:p>
+            <a:pPr marL="0" indent="0">
+              <a:buNone/>
+            </a:pPr>
+            <a:r>
+              <a:rPr lang="en-US" dirty="0"/>
+              <a:t>This project can  be enhanced for future requirements</a:t>
+            </a:r>
+          </a:p>
+          <a:p>
+            <a:r>
+              <a:rPr lang="en-US" dirty="0"/>
+              <a:t>This can be enhanced for future requirements like  - 3 or 4-Way Matching - If additional details are provided ( Order Information, Shipment, Invoice and Payments)</a:t>
+            </a:r>
+          </a:p>
+          <a:p>
+            <a:r>
+              <a:rPr lang="en-US" dirty="0"/>
+              <a:t>Matched and Unmatched Detail level Matching ( SKUs, and Quantities)</a:t>
+            </a:r>
+          </a:p>
+          <a:p>
+            <a:r>
+              <a:rPr lang="en-US" dirty="0"/>
+              <a:t>Multiple Format Input files &amp; sources </a:t>
+            </a:r>
+          </a:p>
+          <a:p>
+            <a:r>
+              <a:rPr lang="en-US" dirty="0"/>
+              <a:t>Data Security/User authentication requirements</a:t>
+            </a:r>
+          </a:p>
+          <a:p>
+            <a:r>
+              <a:rPr lang="en-US" dirty="0"/>
+              <a:t>Payment processing – Accounts Payable process </a:t>
+            </a:r>
+            <a:r>
+              <a:rPr lang="en-US" dirty="0" err="1"/>
+              <a:t>etc</a:t>
+            </a:r>
+            <a:endParaRPr lang="en-US" dirty="0"/>
+          </a:p>
+          <a:p>
+            <a:endParaRPr lang="en-US" dirty="0"/>
+          </a:p>
+          <a:p>
+            <a:endParaRPr lang="en-US" dirty="0"/>
           </a:p>
         </p:txBody>
       </p:sp>
     </p:spTree>
     <p:extLst>
       <p:ext uri="{BB962C8B-B14F-4D97-AF65-F5344CB8AC3E}">
-        <p14:creationId xmlns:p14="http://schemas.microsoft.com/office/powerpoint/2010/main" val="3552511077"/>
+        <p14:creationId xmlns:p14="http://schemas.microsoft.com/office/powerpoint/2010/main" val="819744658"/>
       </p:ext>
     </p:extLst>
   </p:cSld>
@@ -10013,7 +10820,13 @@
           <a:p>
             <a:r>
               <a:rPr lang="en-US" dirty="0"/>
-              <a:t>Project Flow –  Load Input Data-&gt; Invoice Processing -&gt; Matching/Unmatching -&gt; Output Rendering using Python API</a:t>
+              <a:t>Project Flow – SDLC Life Cycle =&gt; Requirements to deployment &amp; Conclusion. </a:t>
+            </a:r>
+          </a:p>
+          <a:p>
+            <a:r>
+              <a:rPr lang="en-US" dirty="0"/>
+              <a:t>Functional Flow -  Load Input Data-&gt; Invoice Processing -&gt; Matching/Unmatching -&gt; Output Rendering using Python API</a:t>
             </a:r>
           </a:p>
         </p:txBody>
@@ -10032,7 +10845,7 @@
         </p:nvGrpSpPr>
         <p:grpSpPr>
           <a:xfrm>
-            <a:off x="2666244" y="2250700"/>
+            <a:off x="2666244" y="2925250"/>
             <a:ext cx="1587930" cy="864531"/>
             <a:chOff x="79845" y="1950"/>
             <a:chExt cx="1587930" cy="864531"/>
@@ -10176,7 +10989,7 @@
         </p:nvSpPr>
         <p:spPr>
           <a:xfrm rot="10800000">
-            <a:off x="3271631" y="3269880"/>
+            <a:off x="3271631" y="3944430"/>
             <a:ext cx="377157" cy="262115"/>
           </a:xfrm>
           <a:prstGeom prst="triangle">
@@ -10237,7 +11050,7 @@
         </p:nvGrpSpPr>
         <p:grpSpPr>
           <a:xfrm>
-            <a:off x="2589212" y="3671808"/>
+            <a:off x="2589212" y="4346358"/>
             <a:ext cx="1741995" cy="718754"/>
             <a:chOff x="2813" y="1423058"/>
             <a:chExt cx="1741995" cy="718754"/>
@@ -10385,7 +11198,7 @@
         </p:nvSpPr>
         <p:spPr>
           <a:xfrm rot="10800000">
-            <a:off x="3271631" y="4634921"/>
+            <a:off x="3271631" y="5309471"/>
             <a:ext cx="377157" cy="262115"/>
           </a:xfrm>
           <a:prstGeom prst="triangle">
@@ -10446,7 +11259,7 @@
         </p:nvGrpSpPr>
         <p:grpSpPr>
           <a:xfrm>
-            <a:off x="2678021" y="5126559"/>
+            <a:off x="2678021" y="5801109"/>
             <a:ext cx="1564376" cy="718754"/>
             <a:chOff x="91622" y="2877809"/>
             <a:chExt cx="1564376" cy="718754"/>
@@ -10590,7 +11403,7 @@
         </p:nvSpPr>
         <p:spPr>
           <a:xfrm rot="5491969">
-            <a:off x="4575190" y="5389760"/>
+            <a:off x="4575190" y="6064310"/>
             <a:ext cx="377157" cy="262115"/>
           </a:xfrm>
           <a:prstGeom prst="triangle">
@@ -10651,7 +11464,7 @@
         </p:nvGrpSpPr>
         <p:grpSpPr>
           <a:xfrm>
-            <a:off x="5270864" y="5192468"/>
+            <a:off x="5270864" y="5867018"/>
             <a:ext cx="1304877" cy="718754"/>
             <a:chOff x="2684465" y="2943718"/>
             <a:chExt cx="1304877" cy="718754"/>
@@ -10799,7 +11612,7 @@
         </p:nvSpPr>
         <p:spPr>
           <a:xfrm rot="21587978">
-            <a:off x="5677694" y="4746752"/>
+            <a:off x="5677694" y="5421302"/>
             <a:ext cx="377157" cy="262115"/>
           </a:xfrm>
           <a:prstGeom prst="triangle">
@@ -10860,7 +11673,7 @@
         </p:nvGrpSpPr>
         <p:grpSpPr>
           <a:xfrm>
-            <a:off x="4691271" y="3406368"/>
+            <a:off x="4691271" y="4080918"/>
             <a:ext cx="2200151" cy="1171771"/>
             <a:chOff x="2104872" y="1157618"/>
             <a:chExt cx="2200151" cy="1171771"/>
@@ -11004,7 +11817,7 @@
         </p:nvGrpSpPr>
         <p:grpSpPr>
           <a:xfrm>
-            <a:off x="7700981" y="3577630"/>
+            <a:off x="7700981" y="4252180"/>
             <a:ext cx="1747594" cy="718754"/>
             <a:chOff x="5114582" y="1328880"/>
             <a:chExt cx="1747594" cy="718754"/>
@@ -11148,7 +11961,7 @@
         </p:nvSpPr>
         <p:spPr>
           <a:xfrm rot="10772618">
-            <a:off x="8392608" y="4610591"/>
+            <a:off x="8392608" y="5285141"/>
             <a:ext cx="377157" cy="262115"/>
           </a:xfrm>
           <a:prstGeom prst="triangle">
@@ -11209,7 +12022,7 @@
         </p:nvGrpSpPr>
         <p:grpSpPr>
           <a:xfrm>
-            <a:off x="10047685" y="5159377"/>
+            <a:off x="10047685" y="5833927"/>
             <a:ext cx="1517614" cy="718754"/>
             <a:chOff x="7461286" y="2910627"/>
             <a:chExt cx="1517614" cy="718754"/>
@@ -11353,7 +12166,7 @@
         </p:nvSpPr>
         <p:spPr>
           <a:xfrm rot="21589855">
-            <a:off x="10615822" y="4679114"/>
+            <a:off x="10615822" y="5353664"/>
             <a:ext cx="377157" cy="262115"/>
           </a:xfrm>
           <a:prstGeom prst="triangle">
@@ -11414,7 +12227,7 @@
         </p:nvGrpSpPr>
         <p:grpSpPr>
           <a:xfrm>
-            <a:off x="10041286" y="3435086"/>
+            <a:off x="10041286" y="4109636"/>
             <a:ext cx="1521184" cy="1040717"/>
             <a:chOff x="7454887" y="1186336"/>
             <a:chExt cx="1521184" cy="1040717"/>
@@ -11580,7 +12393,7 @@
         </p:nvGrpSpPr>
         <p:grpSpPr>
           <a:xfrm>
-            <a:off x="7516922" y="5141615"/>
+            <a:off x="7516922" y="5816165"/>
             <a:ext cx="1931653" cy="718754"/>
             <a:chOff x="5035253" y="2923328"/>
             <a:chExt cx="1931653" cy="718754"/>
@@ -11704,7 +12517,7 @@
                   <a:latin typeface="Arial" panose="020B0604020202020204" pitchFamily="34" charset="0"/>
                   <a:cs typeface="Arial" panose="020B0604020202020204" pitchFamily="34" charset="0"/>
                 </a:rPr>
-                <a:t>Evaluation</a:t>
+                <a:t>Evaluation/Lesson’s Learned</a:t>
               </a:r>
             </a:p>
           </p:txBody>
@@ -11724,7 +12537,7 @@
         </p:nvSpPr>
         <p:spPr>
           <a:xfrm rot="5380324">
-            <a:off x="9514575" y="5362949"/>
+            <a:off x="9514575" y="6037499"/>
             <a:ext cx="377157" cy="262115"/>
           </a:xfrm>
           <a:prstGeom prst="triangle">
@@ -11785,7 +12598,7 @@
         </p:nvSpPr>
         <p:spPr>
           <a:xfrm rot="5331775">
-            <a:off x="7123184" y="3824387"/>
+            <a:off x="7123184" y="4498937"/>
             <a:ext cx="377157" cy="262115"/>
           </a:xfrm>
           <a:prstGeom prst="triangle">
@@ -11836,6 +12649,128 @@
     <p:extLst>
       <p:ext uri="{BB962C8B-B14F-4D97-AF65-F5344CB8AC3E}">
         <p14:creationId xmlns:p14="http://schemas.microsoft.com/office/powerpoint/2010/main" val="2239464748"/>
+      </p:ext>
+    </p:extLst>
+  </p:cSld>
+  <p:clrMapOvr>
+    <a:masterClrMapping/>
+  </p:clrMapOvr>
+</p:sld>
+</file>
+
+<file path=ppt/slides/slide20.xml><?xml version="1.0" encoding="utf-8"?>
+<p:sld xmlns:a="http://schemas.openxmlformats.org/drawingml/2006/main" xmlns:r="http://schemas.openxmlformats.org/officeDocument/2006/relationships" xmlns:p="http://schemas.openxmlformats.org/presentationml/2006/main">
+  <p:cSld>
+    <p:spTree>
+      <p:nvGrpSpPr>
+        <p:cNvPr id="1" name=""/>
+        <p:cNvGrpSpPr/>
+        <p:nvPr/>
+      </p:nvGrpSpPr>
+      <p:grpSpPr>
+        <a:xfrm>
+          <a:off x="0" y="0"/>
+          <a:ext cx="0" cy="0"/>
+          <a:chOff x="0" y="0"/>
+          <a:chExt cx="0" cy="0"/>
+        </a:xfrm>
+      </p:grpSpPr>
+      <p:sp>
+        <p:nvSpPr>
+          <p:cNvPr id="2" name="Title 1">
+            <a:extLst>
+              <a:ext uri="{FF2B5EF4-FFF2-40B4-BE49-F238E27FC236}">
+                <a16:creationId xmlns:a16="http://schemas.microsoft.com/office/drawing/2014/main" id="{D4622968-4082-3748-82F2-052EDEA9ED00}"/>
+              </a:ext>
+            </a:extLst>
+          </p:cNvPr>
+          <p:cNvSpPr>
+            <a:spLocks noGrp="1"/>
+          </p:cNvSpPr>
+          <p:nvPr>
+            <p:ph type="title"/>
+          </p:nvPr>
+        </p:nvSpPr>
+        <p:spPr/>
+        <p:txBody>
+          <a:bodyPr/>
+          <a:lstStyle/>
+          <a:p>
+            <a:r>
+              <a:rPr lang="en-US" dirty="0"/>
+              <a:t>Thank you</a:t>
+            </a:r>
+          </a:p>
+        </p:txBody>
+      </p:sp>
+      <p:sp>
+        <p:nvSpPr>
+          <p:cNvPr id="3" name="Text Placeholder 2">
+            <a:extLst>
+              <a:ext uri="{FF2B5EF4-FFF2-40B4-BE49-F238E27FC236}">
+                <a16:creationId xmlns:a16="http://schemas.microsoft.com/office/drawing/2014/main" id="{3E2E07F3-1428-7D4B-BC55-3D00EEFAC808}"/>
+              </a:ext>
+            </a:extLst>
+          </p:cNvPr>
+          <p:cNvSpPr>
+            <a:spLocks noGrp="1"/>
+          </p:cNvSpPr>
+          <p:nvPr>
+            <p:ph type="body" sz="quarter" idx="13"/>
+          </p:nvPr>
+        </p:nvSpPr>
+        <p:spPr/>
+        <p:txBody>
+          <a:bodyPr/>
+          <a:lstStyle/>
+          <a:p>
+            <a:r>
+              <a:rPr lang="en-US" dirty="0"/>
+              <a:t>- Suresh CHINNA SHANMUGAM</a:t>
+            </a:r>
+          </a:p>
+        </p:txBody>
+      </p:sp>
+      <p:sp>
+        <p:nvSpPr>
+          <p:cNvPr id="4" name="Text Placeholder 3">
+            <a:extLst>
+              <a:ext uri="{FF2B5EF4-FFF2-40B4-BE49-F238E27FC236}">
+                <a16:creationId xmlns:a16="http://schemas.microsoft.com/office/drawing/2014/main" id="{1018D8BC-E493-7449-8A87-252F3349C857}"/>
+              </a:ext>
+            </a:extLst>
+          </p:cNvPr>
+          <p:cNvSpPr>
+            <a:spLocks noGrp="1"/>
+          </p:cNvSpPr>
+          <p:nvPr>
+            <p:ph type="body" sz="half" idx="2"/>
+          </p:nvPr>
+        </p:nvSpPr>
+        <p:spPr/>
+        <p:txBody>
+          <a:bodyPr>
+            <a:normAutofit lnSpcReduction="10000"/>
+          </a:bodyPr>
+          <a:lstStyle/>
+          <a:p>
+            <a:r>
+              <a:rPr lang="en-US" dirty="0"/>
+              <a:t>- Email: suresh.cs0524@gmail.com</a:t>
+            </a:r>
+          </a:p>
+          <a:p>
+            <a:r>
+              <a:rPr lang="en-US" dirty="0"/>
+              <a:t>- Mobile: +33 758072207</a:t>
+            </a:r>
+          </a:p>
+        </p:txBody>
+      </p:sp>
+    </p:spTree>
+    <p:extLst>
+      <p:ext uri="{BB962C8B-B14F-4D97-AF65-F5344CB8AC3E}">
+        <p14:creationId xmlns:p14="http://schemas.microsoft.com/office/powerpoint/2010/main" val="3552511077"/>
       </p:ext>
     </p:extLst>
   </p:cSld>
@@ -14612,47 +15547,49 @@
         <p:spPr>
           <a:xfrm>
             <a:off x="1608667" y="387044"/>
-            <a:ext cx="10447866" cy="1280890"/>
+            <a:ext cx="10447866" cy="962071"/>
           </a:xfrm>
         </p:spPr>
         <p:txBody>
           <a:bodyPr/>
           <a:lstStyle/>
           <a:p>
-            <a:endParaRPr lang="en-US" dirty="0"/>
+            <a:r>
+              <a:rPr lang="en-US" dirty="0"/>
+              <a:t>Solution Architecture Diagram – High level</a:t>
+            </a:r>
           </a:p>
         </p:txBody>
       </p:sp>
-      <p:sp>
-        <p:nvSpPr>
-          <p:cNvPr id="3" name="Content Placeholder 2">
+      <p:pic>
+        <p:nvPicPr>
+          <p:cNvPr id="5" name="Content Placeholder 4" descr="Diagram&#10;&#10;Description automatically generated">
             <a:extLst>
               <a:ext uri="{FF2B5EF4-FFF2-40B4-BE49-F238E27FC236}">
-                <a16:creationId xmlns:a16="http://schemas.microsoft.com/office/drawing/2014/main" id="{1A5F025B-D545-6448-A4FE-43C664451943}"/>
+                <a16:creationId xmlns:a16="http://schemas.microsoft.com/office/drawing/2014/main" id="{D4E75C01-38A9-BD46-B912-179AC51C8F70}"/>
               </a:ext>
             </a:extLst>
           </p:cNvPr>
-          <p:cNvSpPr>
-            <a:spLocks noGrp="1"/>
-          </p:cNvSpPr>
+          <p:cNvPicPr>
+            <a:picLocks noGrp="1" noChangeAspect="1"/>
+          </p:cNvPicPr>
           <p:nvPr>
             <p:ph idx="1"/>
           </p:nvPr>
-        </p:nvSpPr>
+        </p:nvPicPr>
+        <p:blipFill>
+          <a:blip r:embed="rId2"/>
+          <a:stretch>
+            <a:fillRect/>
+          </a:stretch>
+        </p:blipFill>
         <p:spPr>
           <a:xfrm>
-            <a:off x="1608667" y="1667934"/>
-            <a:ext cx="10447866" cy="5190066"/>
+            <a:off x="2271370" y="1446311"/>
+            <a:ext cx="7966912" cy="5189537"/>
           </a:xfrm>
         </p:spPr>
-        <p:txBody>
-          <a:bodyPr/>
-          <a:lstStyle/>
-          <a:p>
-            <a:endParaRPr lang="en-US" dirty="0"/>
-          </a:p>
-        </p:txBody>
-      </p:sp>
+      </p:pic>
     </p:spTree>
     <p:extLst>
       <p:ext uri="{BB962C8B-B14F-4D97-AF65-F5344CB8AC3E}">
@@ -14688,7 +15625,7 @@
           <p:cNvPr id="2" name="Title 1">
             <a:extLst>
               <a:ext uri="{FF2B5EF4-FFF2-40B4-BE49-F238E27FC236}">
-                <a16:creationId xmlns:a16="http://schemas.microsoft.com/office/drawing/2014/main" id="{45A6649C-9843-8140-AA8C-562AA1DBB53D}"/>
+                <a16:creationId xmlns:a16="http://schemas.microsoft.com/office/drawing/2014/main" id="{FE4B9D10-A6F6-5D46-BC45-67196CAC5C7C}"/>
               </a:ext>
             </a:extLst>
           </p:cNvPr>
@@ -14696,57 +15633,30 @@
             <a:spLocks noGrp="1"/>
           </p:cNvSpPr>
           <p:nvPr>
-            <p:ph type="title"/>
+            <p:ph type="ctrTitle"/>
           </p:nvPr>
         </p:nvSpPr>
         <p:spPr>
           <a:xfrm>
-            <a:off x="1608667" y="387044"/>
-            <a:ext cx="10447866" cy="1280890"/>
+            <a:off x="2589213" y="1166219"/>
+            <a:ext cx="8915399" cy="2262781"/>
           </a:xfrm>
         </p:spPr>
         <p:txBody>
           <a:bodyPr/>
           <a:lstStyle/>
           <a:p>
-            <a:endParaRPr lang="en-US" dirty="0"/>
-          </a:p>
-        </p:txBody>
-      </p:sp>
-      <p:sp>
-        <p:nvSpPr>
-          <p:cNvPr id="3" name="Content Placeholder 2">
-            <a:extLst>
-              <a:ext uri="{FF2B5EF4-FFF2-40B4-BE49-F238E27FC236}">
-                <a16:creationId xmlns:a16="http://schemas.microsoft.com/office/drawing/2014/main" id="{1A5F025B-D545-6448-A4FE-43C664451943}"/>
-              </a:ext>
-            </a:extLst>
-          </p:cNvPr>
-          <p:cNvSpPr>
-            <a:spLocks noGrp="1"/>
-          </p:cNvSpPr>
-          <p:nvPr>
-            <p:ph idx="1"/>
-          </p:nvPr>
-        </p:nvSpPr>
-        <p:spPr>
-          <a:xfrm>
-            <a:off x="1608667" y="1667934"/>
-            <a:ext cx="10447866" cy="5190066"/>
-          </a:xfrm>
-        </p:spPr>
-        <p:txBody>
-          <a:bodyPr/>
-          <a:lstStyle/>
-          <a:p>
-            <a:endParaRPr lang="en-US" dirty="0"/>
+            <a:r>
+              <a:rPr lang="en-US" dirty="0"/>
+              <a:t>Implementation</a:t>
+            </a:r>
           </a:p>
         </p:txBody>
       </p:sp>
     </p:spTree>
     <p:extLst>
       <p:ext uri="{BB962C8B-B14F-4D97-AF65-F5344CB8AC3E}">
-        <p14:creationId xmlns:p14="http://schemas.microsoft.com/office/powerpoint/2010/main" val="1377503245"/>
+        <p14:creationId xmlns:p14="http://schemas.microsoft.com/office/powerpoint/2010/main" val="1332904642"/>
       </p:ext>
     </p:extLst>
   </p:cSld>
@@ -14759,6 +15669,32 @@
 <file path=ppt/slides/slide9.xml><?xml version="1.0" encoding="utf-8"?>
 <p:sld xmlns:a="http://schemas.openxmlformats.org/drawingml/2006/main" xmlns:r="http://schemas.openxmlformats.org/officeDocument/2006/relationships" xmlns:p="http://schemas.openxmlformats.org/presentationml/2006/main">
   <p:cSld>
+    <p:bg>
+      <p:bgPr>
+        <a:gradFill rotWithShape="1">
+          <a:gsLst>
+            <a:gs pos="0">
+              <a:schemeClr val="bg2">
+                <a:tint val="90000"/>
+                <a:satMod val="92000"/>
+                <a:lumMod val="120000"/>
+              </a:schemeClr>
+            </a:gs>
+            <a:gs pos="100000">
+              <a:schemeClr val="bg2">
+                <a:shade val="98000"/>
+                <a:satMod val="120000"/>
+                <a:lumMod val="98000"/>
+              </a:schemeClr>
+            </a:gs>
+          </a:gsLst>
+          <a:path path="circle">
+            <a:fillToRect l="50000" t="50000" r="100000" b="100000"/>
+          </a:path>
+        </a:gradFill>
+        <a:effectLst/>
+      </p:bgPr>
+    </p:bg>
     <p:spTree>
       <p:nvGrpSpPr>
         <p:cNvPr id="1" name=""/>
@@ -14773,12 +15709,72 @@
           <a:chExt cx="0" cy="0"/>
         </a:xfrm>
       </p:grpSpPr>
+      <p:sp useBgFill="1">
+        <p:nvSpPr>
+          <p:cNvPr id="12" name="Rectangle 11">
+            <a:extLst>
+              <a:ext uri="{FF2B5EF4-FFF2-40B4-BE49-F238E27FC236}">
+                <a16:creationId xmlns:a16="http://schemas.microsoft.com/office/drawing/2014/main" id="{B2EC7880-C5D9-40A8-A6B0-3198AD07AD1B}"/>
+              </a:ext>
+              <a:ext uri="{C183D7F6-B498-43B3-948B-1728B52AA6E4}">
+                <adec:decorative xmlns:adec="http://schemas.microsoft.com/office/drawing/2017/decorative" val="1"/>
+              </a:ext>
+            </a:extLst>
+          </p:cNvPr>
+          <p:cNvSpPr>
+            <a:spLocks noGrp="1" noRot="1" noChangeAspect="1" noMove="1" noResize="1" noEditPoints="1" noAdjustHandles="1" noChangeArrowheads="1" noChangeShapeType="1" noTextEdit="1"/>
+          </p:cNvSpPr>
+          <p:nvPr>
+            <p:extLst>
+              <p:ext uri="{386F3935-93C4-4BCD-93E2-E3B085C9AB24}">
+                <p16:designElem xmlns:p16="http://schemas.microsoft.com/office/powerpoint/2015/main" val="1"/>
+              </p:ext>
+            </p:extLst>
+          </p:nvPr>
+        </p:nvSpPr>
+        <p:spPr>
+          <a:xfrm>
+            <a:off x="0" y="-786"/>
+            <a:ext cx="12192000" cy="6854038"/>
+          </a:xfrm>
+          <a:prstGeom prst="rect">
+            <a:avLst/>
+          </a:prstGeom>
+          <a:ln>
+            <a:noFill/>
+          </a:ln>
+        </p:spPr>
+        <p:style>
+          <a:lnRef idx="2">
+            <a:schemeClr val="accent1">
+              <a:shade val="50000"/>
+            </a:schemeClr>
+          </a:lnRef>
+          <a:fillRef idx="1">
+            <a:schemeClr val="accent1"/>
+          </a:fillRef>
+          <a:effectRef idx="0">
+            <a:schemeClr val="accent1"/>
+          </a:effectRef>
+          <a:fontRef idx="minor">
+            <a:schemeClr val="lt1"/>
+          </a:fontRef>
+        </p:style>
+        <p:txBody>
+          <a:bodyPr rtlCol="0" anchor="ctr"/>
+          <a:lstStyle/>
+          <a:p>
+            <a:pPr algn="ctr"/>
+            <a:endParaRPr lang="en-US"/>
+          </a:p>
+        </p:txBody>
+      </p:sp>
       <p:sp>
         <p:nvSpPr>
           <p:cNvPr id="2" name="Title 1">
             <a:extLst>
               <a:ext uri="{FF2B5EF4-FFF2-40B4-BE49-F238E27FC236}">
-                <a16:creationId xmlns:a16="http://schemas.microsoft.com/office/drawing/2014/main" id="{FE4B9D10-A6F6-5D46-BC45-67196CAC5C7C}"/>
+                <a16:creationId xmlns:a16="http://schemas.microsoft.com/office/drawing/2014/main" id="{45A6649C-9843-8140-AA8C-562AA1DBB53D}"/>
               </a:ext>
             </a:extLst>
           </p:cNvPr>
@@ -14786,30 +15782,557 @@
             <a:spLocks noGrp="1"/>
           </p:cNvSpPr>
           <p:nvPr>
-            <p:ph type="ctrTitle"/>
+            <p:ph type="title"/>
           </p:nvPr>
         </p:nvSpPr>
         <p:spPr>
           <a:xfrm>
-            <a:off x="2589213" y="1166219"/>
-            <a:ext cx="8915399" cy="2262781"/>
+            <a:off x="649224" y="645106"/>
+            <a:ext cx="3650279" cy="1259894"/>
           </a:xfrm>
         </p:spPr>
         <p:txBody>
-          <a:bodyPr/>
+          <a:bodyPr>
+            <a:normAutofit/>
+          </a:bodyPr>
           <a:lstStyle/>
           <a:p>
+            <a:pPr>
+              <a:lnSpc>
+                <a:spcPct val="90000"/>
+              </a:lnSpc>
+            </a:pPr>
+            <a:r>
+              <a:rPr lang="en-US" sz="3100"/>
+              <a:t>Implementation – Low Level Design</a:t>
+            </a:r>
+          </a:p>
+        </p:txBody>
+      </p:sp>
+      <p:sp>
+        <p:nvSpPr>
+          <p:cNvPr id="14" name="Rectangle 13">
+            <a:extLst>
+              <a:ext uri="{FF2B5EF4-FFF2-40B4-BE49-F238E27FC236}">
+                <a16:creationId xmlns:a16="http://schemas.microsoft.com/office/drawing/2014/main" id="{94543A62-A2AB-454A-878E-D3D9190D5FC7}"/>
+              </a:ext>
+              <a:ext uri="{C183D7F6-B498-43B3-948B-1728B52AA6E4}">
+                <adec:decorative xmlns:adec="http://schemas.microsoft.com/office/drawing/2017/decorative" val="1"/>
+              </a:ext>
+            </a:extLst>
+          </p:cNvPr>
+          <p:cNvSpPr>
+            <a:spLocks noGrp="1" noRot="1" noChangeAspect="1" noMove="1" noResize="1" noEditPoints="1" noAdjustHandles="1" noChangeArrowheads="1" noChangeShapeType="1" noTextEdit="1"/>
+          </p:cNvSpPr>
+          <p:nvPr>
+            <p:extLst>
+              <p:ext uri="{386F3935-93C4-4BCD-93E2-E3B085C9AB24}">
+                <p16:designElem xmlns:p16="http://schemas.microsoft.com/office/powerpoint/2015/main" val="1"/>
+              </p:ext>
+            </p:extLst>
+          </p:nvPr>
+        </p:nvSpPr>
+        <p:spPr>
+          <a:xfrm>
+            <a:off x="0" y="0"/>
+            <a:ext cx="182880" cy="6858000"/>
+          </a:xfrm>
+          <a:prstGeom prst="rect">
+            <a:avLst/>
+          </a:prstGeom>
+          <a:solidFill>
+            <a:schemeClr val="tx2"/>
+          </a:solidFill>
+          <a:ln>
+            <a:noFill/>
+          </a:ln>
+          <a:effectLst/>
+        </p:spPr>
+        <p:style>
+          <a:lnRef idx="1">
+            <a:schemeClr val="accent1"/>
+          </a:lnRef>
+          <a:fillRef idx="3">
+            <a:schemeClr val="accent1"/>
+          </a:fillRef>
+          <a:effectRef idx="2">
+            <a:schemeClr val="accent1"/>
+          </a:effectRef>
+          <a:fontRef idx="minor">
+            <a:schemeClr val="lt1"/>
+          </a:fontRef>
+        </p:style>
+      </p:sp>
+      <p:sp>
+        <p:nvSpPr>
+          <p:cNvPr id="11" name="Content Placeholder 8">
+            <a:extLst>
+              <a:ext uri="{FF2B5EF4-FFF2-40B4-BE49-F238E27FC236}">
+                <a16:creationId xmlns:a16="http://schemas.microsoft.com/office/drawing/2014/main" id="{E3CA9E68-BDC4-4B54-8885-624C6071F519}"/>
+              </a:ext>
+            </a:extLst>
+          </p:cNvPr>
+          <p:cNvSpPr>
+            <a:spLocks noGrp="1"/>
+          </p:cNvSpPr>
+          <p:nvPr>
+            <p:ph idx="1"/>
+          </p:nvPr>
+        </p:nvSpPr>
+        <p:spPr>
+          <a:xfrm>
+            <a:off x="649225" y="1904999"/>
+            <a:ext cx="3970318" cy="4780613"/>
+          </a:xfrm>
+        </p:spPr>
+        <p:txBody>
+          <a:bodyPr>
+            <a:normAutofit fontScale="77500" lnSpcReduction="20000"/>
+          </a:bodyPr>
+          <a:lstStyle/>
+          <a:p>
             <a:r>
               <a:rPr lang="en-US" dirty="0"/>
-              <a:t>Implementation</a:t>
-            </a:r>
+              <a:t>2 python scripts – </a:t>
+            </a:r>
+            <a:r>
+              <a:rPr lang="en-US" dirty="0" err="1"/>
+              <a:t>main.py</a:t>
+            </a:r>
+            <a:r>
+              <a:rPr lang="en-US" dirty="0"/>
+              <a:t>, </a:t>
+            </a:r>
+            <a:r>
+              <a:rPr lang="en-US" dirty="0" err="1"/>
+              <a:t>InvoiceProcess.py</a:t>
+            </a:r>
+            <a:endParaRPr lang="en-US" dirty="0"/>
+          </a:p>
+          <a:p>
+            <a:r>
+              <a:rPr lang="en-US" dirty="0"/>
+              <a:t>Packages used:</a:t>
+            </a:r>
+          </a:p>
+          <a:p>
+            <a:pPr lvl="1"/>
+            <a:r>
+              <a:rPr lang="en-US" dirty="0"/>
+              <a:t>pandas, </a:t>
+            </a:r>
+            <a:r>
+              <a:rPr lang="en-US" dirty="0" err="1"/>
+              <a:t>pymysql</a:t>
+            </a:r>
+            <a:r>
+              <a:rPr lang="en-US" dirty="0"/>
+              <a:t>, </a:t>
+            </a:r>
+            <a:r>
+              <a:rPr lang="en-US" dirty="0" err="1"/>
+              <a:t>numpy</a:t>
+            </a:r>
+            <a:r>
+              <a:rPr lang="en-US" dirty="0"/>
+              <a:t>, </a:t>
+            </a:r>
+            <a:r>
+              <a:rPr lang="en-US" dirty="0" err="1"/>
+              <a:t>shutil</a:t>
+            </a:r>
+            <a:r>
+              <a:rPr lang="en-US" dirty="0"/>
+              <a:t>, </a:t>
+            </a:r>
+            <a:r>
+              <a:rPr lang="en-US" dirty="0" err="1"/>
+              <a:t>os</a:t>
+            </a:r>
+            <a:r>
+              <a:rPr lang="en-US" dirty="0"/>
+              <a:t>, json, logging, Flask, </a:t>
+            </a:r>
+            <a:r>
+              <a:rPr lang="en-US" dirty="0" err="1"/>
+              <a:t>jsonify</a:t>
+            </a:r>
+            <a:r>
+              <a:rPr lang="en-US" dirty="0"/>
+              <a:t>,  </a:t>
+            </a:r>
+            <a:r>
+              <a:rPr lang="en-US" dirty="0" err="1"/>
+              <a:t>render_template</a:t>
+            </a:r>
+            <a:r>
+              <a:rPr lang="en-US" dirty="0"/>
+              <a:t>, request, redirect</a:t>
+            </a:r>
+          </a:p>
+          <a:p>
+            <a:r>
+              <a:rPr lang="en-US" dirty="0"/>
+              <a:t>Database: </a:t>
+            </a:r>
+            <a:r>
+              <a:rPr lang="en-US" dirty="0" err="1"/>
+              <a:t>mysql</a:t>
+            </a:r>
+            <a:r>
+              <a:rPr lang="en-US" dirty="0"/>
+              <a:t> </a:t>
+            </a:r>
+          </a:p>
+          <a:p>
+            <a:pPr lvl="1"/>
+            <a:r>
+              <a:rPr lang="en-US" dirty="0"/>
+              <a:t>Database Name: </a:t>
+            </a:r>
+            <a:r>
+              <a:rPr lang="en-US" dirty="0" err="1"/>
+              <a:t>InvoiceDB</a:t>
+            </a:r>
+            <a:endParaRPr lang="en-US" dirty="0"/>
+          </a:p>
+          <a:p>
+            <a:pPr lvl="1"/>
+            <a:r>
+              <a:rPr lang="en-US" dirty="0"/>
+              <a:t>Table name: INVOICETAB</a:t>
+            </a:r>
+          </a:p>
+          <a:p>
+            <a:r>
+              <a:rPr lang="en-US" dirty="0"/>
+              <a:t>1 Key class – </a:t>
+            </a:r>
+            <a:r>
+              <a:rPr lang="en-US" dirty="0" err="1"/>
+              <a:t>InvoiceProcess</a:t>
+            </a:r>
+            <a:r>
+              <a:rPr lang="en-US" dirty="0"/>
+              <a:t> with the methods. List of members and methods </a:t>
+            </a:r>
+          </a:p>
+          <a:p>
+            <a:r>
+              <a:rPr lang="en-US" dirty="0"/>
+              <a:t>templates folder used for flask API to load json data into Html page</a:t>
+            </a:r>
+          </a:p>
+          <a:p>
+            <a:pPr lvl="1"/>
+            <a:r>
+              <a:rPr lang="en-US" dirty="0" err="1"/>
+              <a:t>content.html</a:t>
+            </a:r>
+            <a:r>
+              <a:rPr lang="en-US" dirty="0"/>
+              <a:t> – Home Page</a:t>
+            </a:r>
+          </a:p>
+          <a:p>
+            <a:pPr lvl="1"/>
+            <a:r>
+              <a:rPr lang="en-US" dirty="0" err="1"/>
+              <a:t>Index.html</a:t>
+            </a:r>
+            <a:r>
+              <a:rPr lang="en-US" dirty="0"/>
+              <a:t> – Index Page</a:t>
+            </a:r>
+          </a:p>
+          <a:p>
+            <a:pPr lvl="1"/>
+            <a:r>
+              <a:rPr lang="en-US" dirty="0" err="1"/>
+              <a:t>AllRecords.html</a:t>
+            </a:r>
+            <a:endParaRPr lang="en-US" dirty="0"/>
+          </a:p>
+          <a:p>
+            <a:pPr lvl="1"/>
+            <a:r>
+              <a:rPr lang="en-US" dirty="0" err="1"/>
+              <a:t>MatchedInvoicesPayment.html</a:t>
+            </a:r>
+            <a:endParaRPr lang="en-US" dirty="0"/>
+          </a:p>
+          <a:p>
+            <a:pPr lvl="1"/>
+            <a:r>
+              <a:rPr lang="en-US" dirty="0" err="1"/>
+              <a:t>UnmatchedInvoices.Payment.html</a:t>
+            </a:r>
+            <a:endParaRPr lang="en-US" dirty="0"/>
+          </a:p>
+          <a:p>
+            <a:pPr lvl="1"/>
+            <a:r>
+              <a:rPr lang="en-US" dirty="0" err="1"/>
+              <a:t>UnmatchedSummary.html</a:t>
+            </a:r>
+            <a:endParaRPr lang="en-US" dirty="0"/>
+          </a:p>
+          <a:p>
+            <a:pPr lvl="1"/>
+            <a:endParaRPr lang="en-US" dirty="0"/>
+          </a:p>
+        </p:txBody>
+      </p:sp>
+      <p:pic>
+        <p:nvPicPr>
+          <p:cNvPr id="5" name="Content Placeholder 4" descr="Diagram&#10;&#10;Description automatically generated">
+            <a:extLst>
+              <a:ext uri="{FF2B5EF4-FFF2-40B4-BE49-F238E27FC236}">
+                <a16:creationId xmlns:a16="http://schemas.microsoft.com/office/drawing/2014/main" id="{B5698AEC-D82B-9440-83CD-C6111D6C77DA}"/>
+              </a:ext>
+            </a:extLst>
+          </p:cNvPr>
+          <p:cNvPicPr>
+            <a:picLocks noChangeAspect="1"/>
+          </p:cNvPicPr>
+          <p:nvPr/>
+        </p:nvPicPr>
+        <p:blipFill rotWithShape="1">
+          <a:blip r:embed="rId3"/>
+          <a:srcRect r="-4" b="5180"/>
+          <a:stretch/>
+        </p:blipFill>
+        <p:spPr>
+          <a:xfrm>
+            <a:off x="4619543" y="640080"/>
+            <a:ext cx="6953577" cy="5252773"/>
+          </a:xfrm>
+          <a:prstGeom prst="rect">
+            <a:avLst/>
+          </a:prstGeom>
+        </p:spPr>
+      </p:pic>
+      <p:sp>
+        <p:nvSpPr>
+          <p:cNvPr id="16" name="Freeform 11">
+            <a:extLst>
+              <a:ext uri="{FF2B5EF4-FFF2-40B4-BE49-F238E27FC236}">
+                <a16:creationId xmlns:a16="http://schemas.microsoft.com/office/drawing/2014/main" id="{50553464-41F1-4160-9D02-7C5EC7013BDA}"/>
+              </a:ext>
+              <a:ext uri="{C183D7F6-B498-43B3-948B-1728B52AA6E4}">
+                <adec:decorative xmlns:adec="http://schemas.microsoft.com/office/drawing/2017/decorative" val="1"/>
+              </a:ext>
+            </a:extLst>
+          </p:cNvPr>
+          <p:cNvSpPr>
+            <a:spLocks noGrp="1" noRot="1" noChangeAspect="1" noMove="1" noResize="1" noEditPoints="1" noAdjustHandles="1" noChangeArrowheads="1" noChangeShapeType="1" noTextEdit="1"/>
+          </p:cNvSpPr>
+          <p:nvPr>
+            <p:extLst>
+              <p:ext uri="{386F3935-93C4-4BCD-93E2-E3B085C9AB24}">
+                <p16:designElem xmlns:p16="http://schemas.microsoft.com/office/powerpoint/2015/main" val="1"/>
+              </p:ext>
+            </p:extLst>
+          </p:nvPr>
+        </p:nvSpPr>
+        <p:spPr>
+          <a:xfrm>
+            <a:off x="-1" y="6061223"/>
+            <a:ext cx="1038036" cy="506277"/>
+          </a:xfrm>
+          <a:custGeom>
+            <a:avLst/>
+            <a:gdLst>
+              <a:gd name="connsiteX0" fmla="*/ 0 w 1038036"/>
+              <a:gd name="connsiteY0" fmla="*/ 0 h 506277"/>
+              <a:gd name="connsiteX1" fmla="*/ 182880 w 1038036"/>
+              <a:gd name="connsiteY1" fmla="*/ 0 h 506277"/>
+              <a:gd name="connsiteX2" fmla="*/ 291705 w 1038036"/>
+              <a:gd name="connsiteY2" fmla="*/ 0 h 506277"/>
+              <a:gd name="connsiteX3" fmla="*/ 291705 w 1038036"/>
+              <a:gd name="connsiteY3" fmla="*/ 151 h 506277"/>
+              <a:gd name="connsiteX4" fmla="*/ 692049 w 1038036"/>
+              <a:gd name="connsiteY4" fmla="*/ 705 h 506277"/>
+              <a:gd name="connsiteX5" fmla="*/ 782744 w 1038036"/>
+              <a:gd name="connsiteY5" fmla="*/ 705 h 506277"/>
+              <a:gd name="connsiteX6" fmla="*/ 797001 w 1038036"/>
+              <a:gd name="connsiteY6" fmla="*/ 5473 h 506277"/>
+              <a:gd name="connsiteX7" fmla="*/ 801982 w 1038036"/>
+              <a:gd name="connsiteY7" fmla="*/ 10242 h 506277"/>
+              <a:gd name="connsiteX8" fmla="*/ 1030951 w 1038036"/>
+              <a:gd name="connsiteY8" fmla="*/ 239185 h 506277"/>
+              <a:gd name="connsiteX9" fmla="*/ 1030951 w 1038036"/>
+              <a:gd name="connsiteY9" fmla="*/ 267797 h 506277"/>
+              <a:gd name="connsiteX10" fmla="*/ 801982 w 1038036"/>
+              <a:gd name="connsiteY10" fmla="*/ 496740 h 506277"/>
+              <a:gd name="connsiteX11" fmla="*/ 797001 w 1038036"/>
+              <a:gd name="connsiteY11" fmla="*/ 501508 h 506277"/>
+              <a:gd name="connsiteX12" fmla="*/ 782744 w 1038036"/>
+              <a:gd name="connsiteY12" fmla="*/ 506277 h 506277"/>
+              <a:gd name="connsiteX13" fmla="*/ 692049 w 1038036"/>
+              <a:gd name="connsiteY13" fmla="*/ 506277 h 506277"/>
+              <a:gd name="connsiteX14" fmla="*/ 291705 w 1038036"/>
+              <a:gd name="connsiteY14" fmla="*/ 505140 h 506277"/>
+              <a:gd name="connsiteX15" fmla="*/ 291705 w 1038036"/>
+              <a:gd name="connsiteY15" fmla="*/ 506277 h 506277"/>
+              <a:gd name="connsiteX16" fmla="*/ 0 w 1038036"/>
+              <a:gd name="connsiteY16" fmla="*/ 506277 h 506277"/>
+            </a:gdLst>
+            <a:ahLst/>
+            <a:cxnLst>
+              <a:cxn ang="0">
+                <a:pos x="connsiteX0" y="connsiteY0"/>
+              </a:cxn>
+              <a:cxn ang="0">
+                <a:pos x="connsiteX1" y="connsiteY1"/>
+              </a:cxn>
+              <a:cxn ang="0">
+                <a:pos x="connsiteX2" y="connsiteY2"/>
+              </a:cxn>
+              <a:cxn ang="0">
+                <a:pos x="connsiteX3" y="connsiteY3"/>
+              </a:cxn>
+              <a:cxn ang="0">
+                <a:pos x="connsiteX4" y="connsiteY4"/>
+              </a:cxn>
+              <a:cxn ang="0">
+                <a:pos x="connsiteX5" y="connsiteY5"/>
+              </a:cxn>
+              <a:cxn ang="0">
+                <a:pos x="connsiteX6" y="connsiteY6"/>
+              </a:cxn>
+              <a:cxn ang="0">
+                <a:pos x="connsiteX7" y="connsiteY7"/>
+              </a:cxn>
+              <a:cxn ang="0">
+                <a:pos x="connsiteX8" y="connsiteY8"/>
+              </a:cxn>
+              <a:cxn ang="0">
+                <a:pos x="connsiteX9" y="connsiteY9"/>
+              </a:cxn>
+              <a:cxn ang="0">
+                <a:pos x="connsiteX10" y="connsiteY10"/>
+              </a:cxn>
+              <a:cxn ang="0">
+                <a:pos x="connsiteX11" y="connsiteY11"/>
+              </a:cxn>
+              <a:cxn ang="0">
+                <a:pos x="connsiteX12" y="connsiteY12"/>
+              </a:cxn>
+              <a:cxn ang="0">
+                <a:pos x="connsiteX13" y="connsiteY13"/>
+              </a:cxn>
+              <a:cxn ang="0">
+                <a:pos x="connsiteX14" y="connsiteY14"/>
+              </a:cxn>
+              <a:cxn ang="0">
+                <a:pos x="connsiteX15" y="connsiteY15"/>
+              </a:cxn>
+              <a:cxn ang="0">
+                <a:pos x="connsiteX16" y="connsiteY16"/>
+              </a:cxn>
+            </a:cxnLst>
+            <a:rect l="l" t="t" r="r" b="b"/>
+            <a:pathLst>
+              <a:path w="1038036" h="506277">
+                <a:moveTo>
+                  <a:pt x="0" y="0"/>
+                </a:moveTo>
+                <a:lnTo>
+                  <a:pt x="182880" y="0"/>
+                </a:lnTo>
+                <a:lnTo>
+                  <a:pt x="291705" y="0"/>
+                </a:lnTo>
+                <a:lnTo>
+                  <a:pt x="291705" y="151"/>
+                </a:lnTo>
+                <a:lnTo>
+                  <a:pt x="692049" y="705"/>
+                </a:lnTo>
+                <a:lnTo>
+                  <a:pt x="782744" y="705"/>
+                </a:lnTo>
+                <a:cubicBezTo>
+                  <a:pt x="787553" y="705"/>
+                  <a:pt x="792363" y="5473"/>
+                  <a:pt x="797001" y="5473"/>
+                </a:cubicBezTo>
+                <a:cubicBezTo>
+                  <a:pt x="797001" y="10242"/>
+                  <a:pt x="801982" y="10242"/>
+                  <a:pt x="801982" y="10242"/>
+                </a:cubicBezTo>
+                <a:lnTo>
+                  <a:pt x="1030951" y="239185"/>
+                </a:lnTo>
+                <a:cubicBezTo>
+                  <a:pt x="1040398" y="248722"/>
+                  <a:pt x="1040398" y="258259"/>
+                  <a:pt x="1030951" y="267797"/>
+                </a:cubicBezTo>
+                <a:lnTo>
+                  <a:pt x="801982" y="496740"/>
+                </a:lnTo>
+                <a:cubicBezTo>
+                  <a:pt x="800436" y="498363"/>
+                  <a:pt x="798547" y="499885"/>
+                  <a:pt x="797001" y="501508"/>
+                </a:cubicBezTo>
+                <a:cubicBezTo>
+                  <a:pt x="792363" y="506277"/>
+                  <a:pt x="787553" y="506277"/>
+                  <a:pt x="782744" y="506277"/>
+                </a:cubicBezTo>
+                <a:lnTo>
+                  <a:pt x="692049" y="506277"/>
+                </a:lnTo>
+                <a:lnTo>
+                  <a:pt x="291705" y="505140"/>
+                </a:lnTo>
+                <a:lnTo>
+                  <a:pt x="291705" y="506277"/>
+                </a:lnTo>
+                <a:lnTo>
+                  <a:pt x="0" y="506277"/>
+                </a:lnTo>
+                <a:close/>
+              </a:path>
+            </a:pathLst>
+          </a:custGeom>
+          <a:ln>
+            <a:noFill/>
+          </a:ln>
+        </p:spPr>
+        <p:style>
+          <a:lnRef idx="2">
+            <a:schemeClr val="accent1">
+              <a:shade val="50000"/>
+            </a:schemeClr>
+          </a:lnRef>
+          <a:fillRef idx="1">
+            <a:schemeClr val="accent1"/>
+          </a:fillRef>
+          <a:effectRef idx="0">
+            <a:schemeClr val="accent1"/>
+          </a:effectRef>
+          <a:fontRef idx="minor">
+            <a:schemeClr val="lt1"/>
+          </a:fontRef>
+        </p:style>
+        <p:txBody>
+          <a:bodyPr rtlCol="0" anchor="ctr"/>
+          <a:lstStyle/>
+          <a:p>
+            <a:pPr algn="ctr"/>
+            <a:endParaRPr lang="en-US"/>
           </a:p>
         </p:txBody>
       </p:sp>
     </p:spTree>
     <p:extLst>
       <p:ext uri="{BB962C8B-B14F-4D97-AF65-F5344CB8AC3E}">
-        <p14:creationId xmlns:p14="http://schemas.microsoft.com/office/powerpoint/2010/main" val="1332904642"/>
+        <p14:creationId xmlns:p14="http://schemas.microsoft.com/office/powerpoint/2010/main" val="2654444928"/>
       </p:ext>
     </p:extLst>
   </p:cSld>

</xml_diff>